<commit_message>
serverless: add support for pptx export (#353)
Closes #326

---------

Co-authored-by: viseshrp <11642379+viseshrp@users.noreply.github.com>
</commit_message>
<xml_diff>
--- a/tests/serverless/test_data/input.pptx
+++ b/tests/serverless/test_data/input.pptx
@@ -5,31 +5,18 @@
     <p:sldMasterId id="2147483660" r:id="rId1"/>
   </p:sldMasterIdLst>
   <p:notesMasterIdLst>
-    <p:notesMasterId r:id="rId21"/>
+    <p:notesMasterId r:id="rId8"/>
   </p:notesMasterIdLst>
   <p:handoutMasterIdLst>
-    <p:handoutMasterId r:id="rId22"/>
+    <p:handoutMasterId r:id="rId9"/>
   </p:handoutMasterIdLst>
   <p:sldIdLst>
     <p:sldId id="264" r:id="rId2"/>
     <p:sldId id="265" r:id="rId3"/>
-    <p:sldId id="286" r:id="rId4"/>
-    <p:sldId id="281" r:id="rId5"/>
-    <p:sldId id="284" r:id="rId6"/>
-    <p:sldId id="287" r:id="rId7"/>
-    <p:sldId id="289" r:id="rId8"/>
-    <p:sldId id="283" r:id="rId9"/>
-    <p:sldId id="268" r:id="rId10"/>
-    <p:sldId id="269" r:id="rId11"/>
-    <p:sldId id="280" r:id="rId12"/>
-    <p:sldId id="272" r:id="rId13"/>
-    <p:sldId id="285" r:id="rId14"/>
-    <p:sldId id="274" r:id="rId15"/>
-    <p:sldId id="275" r:id="rId16"/>
-    <p:sldId id="288" r:id="rId17"/>
-    <p:sldId id="276" r:id="rId18"/>
-    <p:sldId id="290" r:id="rId19"/>
-    <p:sldId id="273" r:id="rId20"/>
+    <p:sldId id="283" r:id="rId4"/>
+    <p:sldId id="268" r:id="rId5"/>
+    <p:sldId id="269" r:id="rId6"/>
+    <p:sldId id="276" r:id="rId7"/>
   </p:sldIdLst>
   <p:sldSz cx="9144000" cy="6858000" type="screen4x3"/>
   <p:notesSz cx="6858000" cy="9144000"/>
@@ -244,7 +231,7 @@
           <a:p>
             <a:fld id="{85F7BDAE-29A6-4BE2-B157-A0DE3CF5C6D8}" type="datetimeFigureOut">
               <a:rPr lang="en-US" smtClean="0"/>
-              <a:t>9/29/2024</a:t>
+              <a:t>7/21/2025</a:t>
             </a:fld>
             <a:endParaRPr lang="en-US"/>
           </a:p>
@@ -421,7 +408,7 @@
           <a:p>
             <a:fld id="{60EA50AE-3EA1-4D83-B5DA-96E75DC571B0}" type="datetimeFigureOut">
               <a:rPr lang="en-US" smtClean="0"/>
-              <a:t>9/29/2024</a:t>
+              <a:t>7/21/2025</a:t>
             </a:fld>
             <a:endParaRPr lang="en-US"/>
           </a:p>
@@ -4261,1402 +4248,6 @@
 </p:sld>
 </file>
 
-<file path=ppt/slides/slide10.xml><?xml version="1.0" encoding="utf-8"?>
-<p:sld xmlns:a="http://schemas.openxmlformats.org/drawingml/2006/main" xmlns:r="http://schemas.openxmlformats.org/officeDocument/2006/relationships" xmlns:p="http://schemas.openxmlformats.org/presentationml/2006/main">
-  <p:cSld>
-    <p:spTree>
-      <p:nvGrpSpPr>
-        <p:cNvPr id="1" name=""/>
-        <p:cNvGrpSpPr/>
-        <p:nvPr/>
-      </p:nvGrpSpPr>
-      <p:grpSpPr>
-        <a:xfrm>
-          <a:off x="0" y="0"/>
-          <a:ext cx="0" cy="0"/>
-          <a:chOff x="0" y="0"/>
-          <a:chExt cx="0" cy="0"/>
-        </a:xfrm>
-      </p:grpSpPr>
-      <p:sp>
-        <p:nvSpPr>
-          <p:cNvPr id="9" name="Nexus:query=A|i_name|eq|line_plot_title">
-            <a:extLst>
-              <a:ext uri="{FF2B5EF4-FFF2-40B4-BE49-F238E27FC236}">
-                <a16:creationId xmlns:a16="http://schemas.microsoft.com/office/drawing/2014/main" id="{4402613D-5DED-4F17-A5D9-DC4D35D4C72F}"/>
-              </a:ext>
-            </a:extLst>
-          </p:cNvPr>
-          <p:cNvSpPr>
-            <a:spLocks noGrp="1"/>
-          </p:cNvSpPr>
-          <p:nvPr>
-            <p:ph type="title"/>
-          </p:nvPr>
-        </p:nvSpPr>
-        <p:spPr/>
-        <p:txBody>
-          <a:bodyPr/>
-          <a:lstStyle/>
-          <a:p>
-            <a:endParaRPr lang="en-US" dirty="0"/>
-          </a:p>
-        </p:txBody>
-      </p:sp>
-      <p:sp>
-        <p:nvSpPr>
-          <p:cNvPr id="3" name="Slide Number Placeholder 2">
-            <a:extLst>
-              <a:ext uri="{FF2B5EF4-FFF2-40B4-BE49-F238E27FC236}">
-                <a16:creationId xmlns:a16="http://schemas.microsoft.com/office/drawing/2014/main" id="{F0C38A62-2AFB-4657-B26E-B3EFD332E461}"/>
-              </a:ext>
-            </a:extLst>
-          </p:cNvPr>
-          <p:cNvSpPr>
-            <a:spLocks noGrp="1"/>
-          </p:cNvSpPr>
-          <p:nvPr>
-            <p:ph type="sldNum" sz="quarter" idx="10"/>
-          </p:nvPr>
-        </p:nvSpPr>
-        <p:spPr/>
-        <p:txBody>
-          <a:bodyPr/>
-          <a:lstStyle/>
-          <a:p>
-            <a:fld id="{F0D23093-2AB0-F74C-B865-1A12A15B650E}" type="slidenum">
-              <a:rPr lang="en-US" smtClean="0"/>
-              <a:pPr/>
-              <a:t>10</a:t>
-            </a:fld>
-            <a:endParaRPr lang="en-US" dirty="0"/>
-          </a:p>
-        </p:txBody>
-      </p:sp>
-      <p:sp>
-        <p:nvSpPr>
-          <p:cNvPr id="10" name="Nexus:query=A|i_name|eq|line_plot">
-            <a:extLst>
-              <a:ext uri="{FF2B5EF4-FFF2-40B4-BE49-F238E27FC236}">
-                <a16:creationId xmlns:a16="http://schemas.microsoft.com/office/drawing/2014/main" id="{105E7E1A-7A23-4FA2-91AA-43A098EC7F80}"/>
-              </a:ext>
-            </a:extLst>
-          </p:cNvPr>
-          <p:cNvSpPr>
-            <a:spLocks noGrp="1"/>
-          </p:cNvSpPr>
-          <p:nvPr>
-            <p:ph type="chart" sz="quarter" idx="11"/>
-          </p:nvPr>
-        </p:nvSpPr>
-        <p:spPr>
-          <a:xfrm>
-            <a:off x="457201" y="1313773"/>
-            <a:ext cx="8229600" cy="3492885"/>
-          </a:xfrm>
-        </p:spPr>
-        <p:txBody>
-          <a:bodyPr/>
-          <a:lstStyle/>
-          <a:p>
-            <a:endParaRPr lang="en-US"/>
-          </a:p>
-        </p:txBody>
-      </p:sp>
-    </p:spTree>
-    <p:extLst>
-      <p:ext uri="{BB962C8B-B14F-4D97-AF65-F5344CB8AC3E}">
-        <p14:creationId xmlns:p14="http://schemas.microsoft.com/office/powerpoint/2010/main" val="2694634188"/>
-      </p:ext>
-    </p:extLst>
-  </p:cSld>
-  <p:clrMapOvr>
-    <a:masterClrMapping/>
-  </p:clrMapOvr>
-  <mc:AlternateContent xmlns:mc="http://schemas.openxmlformats.org/markup-compatibility/2006" xmlns:p14="http://schemas.microsoft.com/office/powerpoint/2010/main">
-    <mc:Choice Requires="p14">
-      <p:transition p14:dur="250">
-        <p:fade/>
-      </p:transition>
-    </mc:Choice>
-    <mc:Fallback xmlns="">
-      <p:transition>
-        <p:fade/>
-      </p:transition>
-    </mc:Fallback>
-  </mc:AlternateContent>
-</p:sld>
-</file>
-
-<file path=ppt/slides/slide11.xml><?xml version="1.0" encoding="utf-8"?>
-<p:sld xmlns:a="http://schemas.openxmlformats.org/drawingml/2006/main" xmlns:r="http://schemas.openxmlformats.org/officeDocument/2006/relationships" xmlns:p="http://schemas.openxmlformats.org/presentationml/2006/main">
-  <p:cSld>
-    <p:spTree>
-      <p:nvGrpSpPr>
-        <p:cNvPr id="1" name=""/>
-        <p:cNvGrpSpPr/>
-        <p:nvPr/>
-      </p:nvGrpSpPr>
-      <p:grpSpPr>
-        <a:xfrm>
-          <a:off x="0" y="0"/>
-          <a:ext cx="0" cy="0"/>
-          <a:chOff x="0" y="0"/>
-          <a:chExt cx="0" cy="0"/>
-        </a:xfrm>
-      </p:grpSpPr>
-      <p:sp>
-        <p:nvSpPr>
-          <p:cNvPr id="5" name="Nexus:html_header">
-            <a:extLst>
-              <a:ext uri="{FF2B5EF4-FFF2-40B4-BE49-F238E27FC236}">
-                <a16:creationId xmlns:a16="http://schemas.microsoft.com/office/drawing/2014/main" id="{6A557093-A62F-75F4-5E0B-A805D230525A}"/>
-              </a:ext>
-            </a:extLst>
-          </p:cNvPr>
-          <p:cNvSpPr>
-            <a:spLocks noGrp="1"/>
-          </p:cNvSpPr>
-          <p:nvPr>
-            <p:ph type="title"/>
-          </p:nvPr>
-        </p:nvSpPr>
-        <p:spPr/>
-        <p:txBody>
-          <a:bodyPr/>
-          <a:lstStyle/>
-          <a:p>
-            <a:endParaRPr lang="en-US" dirty="0"/>
-          </a:p>
-        </p:txBody>
-      </p:sp>
-      <p:sp>
-        <p:nvSpPr>
-          <p:cNvPr id="3" name="Slide Number Placeholder 2">
-            <a:extLst>
-              <a:ext uri="{FF2B5EF4-FFF2-40B4-BE49-F238E27FC236}">
-                <a16:creationId xmlns:a16="http://schemas.microsoft.com/office/drawing/2014/main" id="{DE8022EC-FF43-DE23-F0E4-C511C790767A}"/>
-              </a:ext>
-            </a:extLst>
-          </p:cNvPr>
-          <p:cNvSpPr>
-            <a:spLocks noGrp="1"/>
-          </p:cNvSpPr>
-          <p:nvPr>
-            <p:ph type="sldNum" sz="quarter" idx="10"/>
-          </p:nvPr>
-        </p:nvSpPr>
-        <p:spPr/>
-        <p:txBody>
-          <a:bodyPr/>
-          <a:lstStyle/>
-          <a:p>
-            <a:fld id="{F0D23093-2AB0-F74C-B865-1A12A15B650E}" type="slidenum">
-              <a:rPr lang="en-US" smtClean="0"/>
-              <a:pPr/>
-              <a:t>11</a:t>
-            </a:fld>
-            <a:endParaRPr lang="en-US" dirty="0"/>
-          </a:p>
-        </p:txBody>
-      </p:sp>
-      <p:sp>
-        <p:nvSpPr>
-          <p:cNvPr id="6" name="Nexus:query=A|i_name|eq|bar_plot">
-            <a:extLst>
-              <a:ext uri="{FF2B5EF4-FFF2-40B4-BE49-F238E27FC236}">
-                <a16:creationId xmlns:a16="http://schemas.microsoft.com/office/drawing/2014/main" id="{513352E8-F483-7FAB-3C34-81358A39925B}"/>
-              </a:ext>
-            </a:extLst>
-          </p:cNvPr>
-          <p:cNvSpPr>
-            <a:spLocks noGrp="1"/>
-          </p:cNvSpPr>
-          <p:nvPr>
-            <p:ph type="chart" sz="quarter" idx="11"/>
-          </p:nvPr>
-        </p:nvSpPr>
-        <p:spPr/>
-        <p:txBody>
-          <a:bodyPr/>
-          <a:lstStyle/>
-          <a:p>
-            <a:endParaRPr lang="en-US"/>
-          </a:p>
-        </p:txBody>
-      </p:sp>
-      <p:sp>
-        <p:nvSpPr>
-          <p:cNvPr id="7" name="Nexus:comments">
-            <a:extLst>
-              <a:ext uri="{FF2B5EF4-FFF2-40B4-BE49-F238E27FC236}">
-                <a16:creationId xmlns:a16="http://schemas.microsoft.com/office/drawing/2014/main" id="{1E3D0CE5-3970-A918-5464-DE795B503E29}"/>
-              </a:ext>
-            </a:extLst>
-          </p:cNvPr>
-          <p:cNvSpPr>
-            <a:spLocks noGrp="1"/>
-          </p:cNvSpPr>
-          <p:nvPr>
-            <p:ph type="body" sz="quarter" idx="12"/>
-          </p:nvPr>
-        </p:nvSpPr>
-        <p:spPr/>
-        <p:txBody>
-          <a:bodyPr/>
-          <a:lstStyle/>
-          <a:p>
-            <a:endParaRPr lang="en-US" dirty="0"/>
-          </a:p>
-        </p:txBody>
-      </p:sp>
-      <p:sp>
-        <p:nvSpPr>
-          <p:cNvPr id="4" name="TextBox 3">
-            <a:extLst>
-              <a:ext uri="{FF2B5EF4-FFF2-40B4-BE49-F238E27FC236}">
-                <a16:creationId xmlns:a16="http://schemas.microsoft.com/office/drawing/2014/main" id="{EAA2E212-C5CB-1D76-842D-33EABF5109AF}"/>
-              </a:ext>
-            </a:extLst>
-          </p:cNvPr>
-          <p:cNvSpPr txBox="1"/>
-          <p:nvPr/>
-        </p:nvSpPr>
-        <p:spPr>
-          <a:xfrm>
-            <a:off x="3983421" y="1366345"/>
-            <a:ext cx="1145627" cy="369332"/>
-          </a:xfrm>
-          <a:prstGeom prst="rect">
-            <a:avLst/>
-          </a:prstGeom>
-          <a:noFill/>
-        </p:spPr>
-        <p:txBody>
-          <a:bodyPr wrap="square" rtlCol="0">
-            <a:spAutoFit/>
-          </a:bodyPr>
-          <a:lstStyle/>
-          <a:p>
-            <a:r>
-              <a:rPr lang="en-US" dirty="0"/>
-              <a:t>test</a:t>
-            </a:r>
-          </a:p>
-        </p:txBody>
-      </p:sp>
-    </p:spTree>
-    <p:extLst>
-      <p:ext uri="{BB962C8B-B14F-4D97-AF65-F5344CB8AC3E}">
-        <p14:creationId xmlns:p14="http://schemas.microsoft.com/office/powerpoint/2010/main" val="1169717313"/>
-      </p:ext>
-    </p:extLst>
-  </p:cSld>
-  <p:clrMapOvr>
-    <a:masterClrMapping/>
-  </p:clrMapOvr>
-  <mc:AlternateContent xmlns:mc="http://schemas.openxmlformats.org/markup-compatibility/2006" xmlns:p14="http://schemas.microsoft.com/office/powerpoint/2010/main">
-    <mc:Choice Requires="p14">
-      <p:transition p14:dur="250">
-        <p:fade/>
-      </p:transition>
-    </mc:Choice>
-    <mc:Fallback xmlns="">
-      <p:transition>
-        <p:fade/>
-      </p:transition>
-    </mc:Fallback>
-  </mc:AlternateContent>
-</p:sld>
-</file>
-
-<file path=ppt/slides/slide12.xml><?xml version="1.0" encoding="utf-8"?>
-<p:sld xmlns:a="http://schemas.openxmlformats.org/drawingml/2006/main" xmlns:r="http://schemas.openxmlformats.org/officeDocument/2006/relationships" xmlns:p="http://schemas.openxmlformats.org/presentationml/2006/main">
-  <p:cSld>
-    <p:spTree>
-      <p:nvGrpSpPr>
-        <p:cNvPr id="1" name=""/>
-        <p:cNvGrpSpPr/>
-        <p:nvPr/>
-      </p:nvGrpSpPr>
-      <p:grpSpPr>
-        <a:xfrm>
-          <a:off x="0" y="0"/>
-          <a:ext cx="0" cy="0"/>
-          <a:chOff x="0" y="0"/>
-          <a:chExt cx="0" cy="0"/>
-        </a:xfrm>
-      </p:grpSpPr>
-      <p:sp>
-        <p:nvSpPr>
-          <p:cNvPr id="9" name="Nexus:query=A|i_name|eq|pie_plot_title">
-            <a:extLst>
-              <a:ext uri="{FF2B5EF4-FFF2-40B4-BE49-F238E27FC236}">
-                <a16:creationId xmlns:a16="http://schemas.microsoft.com/office/drawing/2014/main" id="{4402613D-5DED-4F17-A5D9-DC4D35D4C72F}"/>
-              </a:ext>
-            </a:extLst>
-          </p:cNvPr>
-          <p:cNvSpPr>
-            <a:spLocks noGrp="1"/>
-          </p:cNvSpPr>
-          <p:nvPr>
-            <p:ph type="title"/>
-          </p:nvPr>
-        </p:nvSpPr>
-        <p:spPr/>
-        <p:txBody>
-          <a:bodyPr/>
-          <a:lstStyle/>
-          <a:p>
-            <a:endParaRPr lang="en-US" dirty="0"/>
-          </a:p>
-        </p:txBody>
-      </p:sp>
-      <p:sp>
-        <p:nvSpPr>
-          <p:cNvPr id="3" name="Slide Number Placeholder 2">
-            <a:extLst>
-              <a:ext uri="{FF2B5EF4-FFF2-40B4-BE49-F238E27FC236}">
-                <a16:creationId xmlns:a16="http://schemas.microsoft.com/office/drawing/2014/main" id="{F0C38A62-2AFB-4657-B26E-B3EFD332E461}"/>
-              </a:ext>
-            </a:extLst>
-          </p:cNvPr>
-          <p:cNvSpPr>
-            <a:spLocks noGrp="1"/>
-          </p:cNvSpPr>
-          <p:nvPr>
-            <p:ph type="sldNum" sz="quarter" idx="10"/>
-          </p:nvPr>
-        </p:nvSpPr>
-        <p:spPr/>
-        <p:txBody>
-          <a:bodyPr/>
-          <a:lstStyle/>
-          <a:p>
-            <a:fld id="{F0D23093-2AB0-F74C-B865-1A12A15B650E}" type="slidenum">
-              <a:rPr lang="en-US" smtClean="0"/>
-              <a:pPr/>
-              <a:t>12</a:t>
-            </a:fld>
-            <a:endParaRPr lang="en-US" dirty="0"/>
-          </a:p>
-        </p:txBody>
-      </p:sp>
-      <p:sp>
-        <p:nvSpPr>
-          <p:cNvPr id="10" name="Nexus:query=A|i_name|eq|pie_plot">
-            <a:extLst>
-              <a:ext uri="{FF2B5EF4-FFF2-40B4-BE49-F238E27FC236}">
-                <a16:creationId xmlns:a16="http://schemas.microsoft.com/office/drawing/2014/main" id="{105E7E1A-7A23-4FA2-91AA-43A098EC7F80}"/>
-              </a:ext>
-            </a:extLst>
-          </p:cNvPr>
-          <p:cNvSpPr>
-            <a:spLocks noGrp="1"/>
-          </p:cNvSpPr>
-          <p:nvPr>
-            <p:ph type="chart" sz="quarter" idx="11"/>
-          </p:nvPr>
-        </p:nvSpPr>
-        <p:spPr>
-          <a:xfrm>
-            <a:off x="457201" y="1369757"/>
-            <a:ext cx="8229600" cy="3492885"/>
-          </a:xfrm>
-        </p:spPr>
-        <p:txBody>
-          <a:bodyPr/>
-          <a:lstStyle/>
-          <a:p>
-            <a:endParaRPr lang="en-US" dirty="0"/>
-          </a:p>
-        </p:txBody>
-      </p:sp>
-    </p:spTree>
-    <p:extLst>
-      <p:ext uri="{BB962C8B-B14F-4D97-AF65-F5344CB8AC3E}">
-        <p14:creationId xmlns:p14="http://schemas.microsoft.com/office/powerpoint/2010/main" val="866686111"/>
-      </p:ext>
-    </p:extLst>
-  </p:cSld>
-  <p:clrMapOvr>
-    <a:masterClrMapping/>
-  </p:clrMapOvr>
-  <mc:AlternateContent xmlns:mc="http://schemas.openxmlformats.org/markup-compatibility/2006" xmlns:p14="http://schemas.microsoft.com/office/powerpoint/2010/main">
-    <mc:Choice Requires="p14">
-      <p:transition p14:dur="250">
-        <p:fade/>
-      </p:transition>
-    </mc:Choice>
-    <mc:Fallback xmlns="">
-      <p:transition>
-        <p:fade/>
-      </p:transition>
-    </mc:Fallback>
-  </mc:AlternateContent>
-</p:sld>
-</file>
-
-<file path=ppt/slides/slide13.xml><?xml version="1.0" encoding="utf-8"?>
-<p:sld xmlns:a="http://schemas.openxmlformats.org/drawingml/2006/main" xmlns:r="http://schemas.openxmlformats.org/officeDocument/2006/relationships" xmlns:p="http://schemas.openxmlformats.org/presentationml/2006/main">
-  <p:cSld>
-    <p:spTree>
-      <p:nvGrpSpPr>
-        <p:cNvPr id="1" name=""/>
-        <p:cNvGrpSpPr/>
-        <p:nvPr/>
-      </p:nvGrpSpPr>
-      <p:grpSpPr>
-        <a:xfrm>
-          <a:off x="0" y="0"/>
-          <a:ext cx="0" cy="0"/>
-          <a:chOff x="0" y="0"/>
-          <a:chExt cx="0" cy="0"/>
-        </a:xfrm>
-      </p:grpSpPr>
-      <p:sp>
-        <p:nvSpPr>
-          <p:cNvPr id="9" name="Nexus:query=A|i_name|eq|tri_plot_title">
-            <a:extLst>
-              <a:ext uri="{FF2B5EF4-FFF2-40B4-BE49-F238E27FC236}">
-                <a16:creationId xmlns:a16="http://schemas.microsoft.com/office/drawing/2014/main" id="{7CBDF3C2-F385-E8C3-E324-D26AE73FB22E}"/>
-              </a:ext>
-            </a:extLst>
-          </p:cNvPr>
-          <p:cNvSpPr>
-            <a:spLocks noGrp="1"/>
-          </p:cNvSpPr>
-          <p:nvPr>
-            <p:ph type="title"/>
-          </p:nvPr>
-        </p:nvSpPr>
-        <p:spPr/>
-        <p:txBody>
-          <a:bodyPr/>
-          <a:lstStyle/>
-          <a:p>
-            <a:endParaRPr lang="en-US" dirty="0"/>
-          </a:p>
-        </p:txBody>
-      </p:sp>
-      <p:sp>
-        <p:nvSpPr>
-          <p:cNvPr id="3" name="Slide Number Placeholder 2">
-            <a:extLst>
-              <a:ext uri="{FF2B5EF4-FFF2-40B4-BE49-F238E27FC236}">
-                <a16:creationId xmlns:a16="http://schemas.microsoft.com/office/drawing/2014/main" id="{5E6FA271-88B4-5042-E52F-C38668CD55C2}"/>
-              </a:ext>
-            </a:extLst>
-          </p:cNvPr>
-          <p:cNvSpPr>
-            <a:spLocks noGrp="1"/>
-          </p:cNvSpPr>
-          <p:nvPr>
-            <p:ph type="sldNum" sz="quarter" idx="10"/>
-          </p:nvPr>
-        </p:nvSpPr>
-        <p:spPr/>
-        <p:txBody>
-          <a:bodyPr/>
-          <a:lstStyle/>
-          <a:p>
-            <a:fld id="{F0D23093-2AB0-F74C-B865-1A12A15B650E}" type="slidenum">
-              <a:rPr lang="en-US" smtClean="0"/>
-              <a:pPr/>
-              <a:t>13</a:t>
-            </a:fld>
-            <a:endParaRPr lang="en-US" dirty="0"/>
-          </a:p>
-        </p:txBody>
-      </p:sp>
-      <p:sp>
-        <p:nvSpPr>
-          <p:cNvPr id="10" name="Nexus:query=A|i_name|eq|bar_plot">
-            <a:extLst>
-              <a:ext uri="{FF2B5EF4-FFF2-40B4-BE49-F238E27FC236}">
-                <a16:creationId xmlns:a16="http://schemas.microsoft.com/office/drawing/2014/main" id="{0BB00397-AB58-83B1-E726-DFCB25C2639C}"/>
-              </a:ext>
-            </a:extLst>
-          </p:cNvPr>
-          <p:cNvSpPr>
-            <a:spLocks noGrp="1"/>
-          </p:cNvSpPr>
-          <p:nvPr>
-            <p:ph type="chart" sz="quarter" idx="11"/>
-          </p:nvPr>
-        </p:nvSpPr>
-        <p:spPr/>
-        <p:txBody>
-          <a:bodyPr/>
-          <a:lstStyle/>
-          <a:p>
-            <a:endParaRPr lang="en-US"/>
-          </a:p>
-        </p:txBody>
-      </p:sp>
-      <p:sp>
-        <p:nvSpPr>
-          <p:cNvPr id="11" name="Nexus:query=A|i_name|eq|pie_plot">
-            <a:extLst>
-              <a:ext uri="{FF2B5EF4-FFF2-40B4-BE49-F238E27FC236}">
-                <a16:creationId xmlns:a16="http://schemas.microsoft.com/office/drawing/2014/main" id="{81C9093F-CED0-BF6B-47D7-65C6898FF68E}"/>
-              </a:ext>
-            </a:extLst>
-          </p:cNvPr>
-          <p:cNvSpPr>
-            <a:spLocks noGrp="1"/>
-          </p:cNvSpPr>
-          <p:nvPr>
-            <p:ph type="chart" sz="quarter" idx="12"/>
-          </p:nvPr>
-        </p:nvSpPr>
-        <p:spPr/>
-        <p:txBody>
-          <a:bodyPr/>
-          <a:lstStyle/>
-          <a:p>
-            <a:endParaRPr lang="en-US"/>
-          </a:p>
-        </p:txBody>
-      </p:sp>
-      <p:sp>
-        <p:nvSpPr>
-          <p:cNvPr id="12" name="Nexus:query=A|i_name|eq|line_plot">
-            <a:extLst>
-              <a:ext uri="{FF2B5EF4-FFF2-40B4-BE49-F238E27FC236}">
-                <a16:creationId xmlns:a16="http://schemas.microsoft.com/office/drawing/2014/main" id="{891008A6-0684-088F-6356-3782DFC4C1D6}"/>
-              </a:ext>
-            </a:extLst>
-          </p:cNvPr>
-          <p:cNvSpPr>
-            <a:spLocks noGrp="1"/>
-          </p:cNvSpPr>
-          <p:nvPr>
-            <p:ph type="chart" sz="quarter" idx="13"/>
-          </p:nvPr>
-        </p:nvSpPr>
-        <p:spPr>
-          <a:xfrm>
-            <a:off x="2466975" y="3758045"/>
-            <a:ext cx="4515716" cy="2333798"/>
-          </a:xfrm>
-        </p:spPr>
-        <p:txBody>
-          <a:bodyPr/>
-          <a:lstStyle/>
-          <a:p>
-            <a:endParaRPr lang="en-US"/>
-          </a:p>
-        </p:txBody>
-      </p:sp>
-    </p:spTree>
-    <p:extLst>
-      <p:ext uri="{BB962C8B-B14F-4D97-AF65-F5344CB8AC3E}">
-        <p14:creationId xmlns:p14="http://schemas.microsoft.com/office/powerpoint/2010/main" val="498271198"/>
-      </p:ext>
-    </p:extLst>
-  </p:cSld>
-  <p:clrMapOvr>
-    <a:masterClrMapping/>
-  </p:clrMapOvr>
-  <mc:AlternateContent xmlns:mc="http://schemas.openxmlformats.org/markup-compatibility/2006" xmlns:p14="http://schemas.microsoft.com/office/powerpoint/2010/main">
-    <mc:Choice Requires="p14">
-      <p:transition p14:dur="250">
-        <p:fade/>
-      </p:transition>
-    </mc:Choice>
-    <mc:Fallback xmlns="">
-      <p:transition>
-        <p:fade/>
-      </p:transition>
-    </mc:Fallback>
-  </mc:AlternateContent>
-</p:sld>
-</file>
-
-<file path=ppt/slides/slide14.xml><?xml version="1.0" encoding="utf-8"?>
-<p:sld xmlns:a="http://schemas.openxmlformats.org/drawingml/2006/main" xmlns:r="http://schemas.openxmlformats.org/officeDocument/2006/relationships" xmlns:p="http://schemas.openxmlformats.org/presentationml/2006/main">
-  <p:cSld>
-    <p:spTree>
-      <p:nvGrpSpPr>
-        <p:cNvPr id="1" name=""/>
-        <p:cNvGrpSpPr/>
-        <p:nvPr/>
-      </p:nvGrpSpPr>
-      <p:grpSpPr>
-        <a:xfrm>
-          <a:off x="0" y="0"/>
-          <a:ext cx="0" cy="0"/>
-          <a:chOff x="0" y="0"/>
-          <a:chExt cx="0" cy="0"/>
-        </a:xfrm>
-      </p:grpSpPr>
-      <p:sp>
-        <p:nvSpPr>
-          <p:cNvPr id="7" name="Nexus:query=AA|i_name|eq|scene_title">
-            <a:extLst>
-              <a:ext uri="{FF2B5EF4-FFF2-40B4-BE49-F238E27FC236}">
-                <a16:creationId xmlns:a16="http://schemas.microsoft.com/office/drawing/2014/main" id="{1CFB06A5-E58D-A1A1-2526-E9FF861A01E3}"/>
-              </a:ext>
-            </a:extLst>
-          </p:cNvPr>
-          <p:cNvSpPr>
-            <a:spLocks noGrp="1"/>
-          </p:cNvSpPr>
-          <p:nvPr>
-            <p:ph type="title"/>
-          </p:nvPr>
-        </p:nvSpPr>
-        <p:spPr/>
-        <p:txBody>
-          <a:bodyPr/>
-          <a:lstStyle/>
-          <a:p>
-            <a:endParaRPr lang="en-US"/>
-          </a:p>
-        </p:txBody>
-      </p:sp>
-      <p:sp>
-        <p:nvSpPr>
-          <p:cNvPr id="3" name="Slide Number Placeholder 2">
-            <a:extLst>
-              <a:ext uri="{FF2B5EF4-FFF2-40B4-BE49-F238E27FC236}">
-                <a16:creationId xmlns:a16="http://schemas.microsoft.com/office/drawing/2014/main" id="{0FB483A2-76AF-4DBF-9017-06B493C33173}"/>
-              </a:ext>
-            </a:extLst>
-          </p:cNvPr>
-          <p:cNvSpPr>
-            <a:spLocks noGrp="1"/>
-          </p:cNvSpPr>
-          <p:nvPr>
-            <p:ph type="sldNum" sz="quarter" idx="10"/>
-          </p:nvPr>
-        </p:nvSpPr>
-        <p:spPr/>
-        <p:txBody>
-          <a:bodyPr/>
-          <a:lstStyle/>
-          <a:p>
-            <a:fld id="{F0D23093-2AB0-F74C-B865-1A12A15B650E}" type="slidenum">
-              <a:rPr lang="en-US" smtClean="0"/>
-              <a:pPr/>
-              <a:t>14</a:t>
-            </a:fld>
-            <a:endParaRPr lang="en-US" dirty="0"/>
-          </a:p>
-        </p:txBody>
-      </p:sp>
-      <p:sp>
-        <p:nvSpPr>
-          <p:cNvPr id="8" name="Nexus:query=A|i_type|cont|scene">
-            <a:extLst>
-              <a:ext uri="{FF2B5EF4-FFF2-40B4-BE49-F238E27FC236}">
-                <a16:creationId xmlns:a16="http://schemas.microsoft.com/office/drawing/2014/main" id="{FE5C7576-A1A2-6E32-8C96-B6993D2B83DE}"/>
-              </a:ext>
-            </a:extLst>
-          </p:cNvPr>
-          <p:cNvSpPr>
-            <a:spLocks noGrp="1"/>
-          </p:cNvSpPr>
-          <p:nvPr>
-            <p:ph type="pic" sz="quarter" idx="11"/>
-          </p:nvPr>
-        </p:nvSpPr>
-        <p:spPr/>
-        <p:txBody>
-          <a:bodyPr/>
-          <a:lstStyle/>
-          <a:p>
-            <a:endParaRPr lang="en-US"/>
-          </a:p>
-        </p:txBody>
-      </p:sp>
-    </p:spTree>
-    <p:extLst>
-      <p:ext uri="{BB962C8B-B14F-4D97-AF65-F5344CB8AC3E}">
-        <p14:creationId xmlns:p14="http://schemas.microsoft.com/office/powerpoint/2010/main" val="713744955"/>
-      </p:ext>
-    </p:extLst>
-  </p:cSld>
-  <p:clrMapOvr>
-    <a:masterClrMapping/>
-  </p:clrMapOvr>
-  <mc:AlternateContent xmlns:mc="http://schemas.openxmlformats.org/markup-compatibility/2006" xmlns:p14="http://schemas.microsoft.com/office/powerpoint/2010/main">
-    <mc:Choice Requires="p14">
-      <p:transition p14:dur="250">
-        <p:fade/>
-      </p:transition>
-    </mc:Choice>
-    <mc:Fallback xmlns="">
-      <p:transition>
-        <p:fade/>
-      </p:transition>
-    </mc:Fallback>
-  </mc:AlternateContent>
-</p:sld>
-</file>
-
-<file path=ppt/slides/slide15.xml><?xml version="1.0" encoding="utf-8"?>
-<p:sld xmlns:a="http://schemas.openxmlformats.org/drawingml/2006/main" xmlns:r="http://schemas.openxmlformats.org/officeDocument/2006/relationships" xmlns:p="http://schemas.openxmlformats.org/presentationml/2006/main">
-  <p:cSld>
-    <p:spTree>
-      <p:nvGrpSpPr>
-        <p:cNvPr id="1" name=""/>
-        <p:cNvGrpSpPr/>
-        <p:nvPr/>
-      </p:nvGrpSpPr>
-      <p:grpSpPr>
-        <a:xfrm>
-          <a:off x="0" y="0"/>
-          <a:ext cx="0" cy="0"/>
-          <a:chOff x="0" y="0"/>
-          <a:chExt cx="0" cy="0"/>
-        </a:xfrm>
-      </p:grpSpPr>
-      <p:sp>
-        <p:nvSpPr>
-          <p:cNvPr id="2" name="Nexus:query=A|i_name|eq|evsn_title">
-            <a:extLst>
-              <a:ext uri="{FF2B5EF4-FFF2-40B4-BE49-F238E27FC236}">
-                <a16:creationId xmlns:a16="http://schemas.microsoft.com/office/drawing/2014/main" id="{C41B8FA0-F328-1268-ED16-60CA009D9B65}"/>
-              </a:ext>
-            </a:extLst>
-          </p:cNvPr>
-          <p:cNvSpPr>
-            <a:spLocks noGrp="1"/>
-          </p:cNvSpPr>
-          <p:nvPr>
-            <p:ph type="title"/>
-          </p:nvPr>
-        </p:nvSpPr>
-        <p:spPr/>
-        <p:txBody>
-          <a:bodyPr/>
-          <a:lstStyle/>
-          <a:p>
-            <a:endParaRPr lang="en-US"/>
-          </a:p>
-        </p:txBody>
-      </p:sp>
-      <p:sp>
-        <p:nvSpPr>
-          <p:cNvPr id="3" name="Slide Number Placeholder 2">
-            <a:extLst>
-              <a:ext uri="{FF2B5EF4-FFF2-40B4-BE49-F238E27FC236}">
-                <a16:creationId xmlns:a16="http://schemas.microsoft.com/office/drawing/2014/main" id="{0FB483A2-76AF-4DBF-9017-06B493C33173}"/>
-              </a:ext>
-            </a:extLst>
-          </p:cNvPr>
-          <p:cNvSpPr>
-            <a:spLocks noGrp="1"/>
-          </p:cNvSpPr>
-          <p:nvPr>
-            <p:ph type="sldNum" sz="quarter" idx="10"/>
-          </p:nvPr>
-        </p:nvSpPr>
-        <p:spPr/>
-        <p:txBody>
-          <a:bodyPr/>
-          <a:lstStyle/>
-          <a:p>
-            <a:fld id="{F0D23093-2AB0-F74C-B865-1A12A15B650E}" type="slidenum">
-              <a:rPr lang="en-US" smtClean="0"/>
-              <a:pPr/>
-              <a:t>15</a:t>
-            </a:fld>
-            <a:endParaRPr lang="en-US" dirty="0"/>
-          </a:p>
-        </p:txBody>
-      </p:sp>
-      <p:sp>
-        <p:nvSpPr>
-          <p:cNvPr id="4" name="Nexus:query=A|i_type|cont|file;A|i_name|cont|scenario">
-            <a:extLst>
-              <a:ext uri="{FF2B5EF4-FFF2-40B4-BE49-F238E27FC236}">
-                <a16:creationId xmlns:a16="http://schemas.microsoft.com/office/drawing/2014/main" id="{5D26899D-65AC-FAC0-2DA7-E11B9DC344C7}"/>
-              </a:ext>
-            </a:extLst>
-          </p:cNvPr>
-          <p:cNvSpPr>
-            <a:spLocks noGrp="1"/>
-          </p:cNvSpPr>
-          <p:nvPr>
-            <p:ph type="pic" sz="quarter" idx="11"/>
-          </p:nvPr>
-        </p:nvSpPr>
-        <p:spPr/>
-        <p:txBody>
-          <a:bodyPr/>
-          <a:lstStyle/>
-          <a:p>
-            <a:endParaRPr lang="en-US"/>
-          </a:p>
-        </p:txBody>
-      </p:sp>
-    </p:spTree>
-    <p:extLst>
-      <p:ext uri="{BB962C8B-B14F-4D97-AF65-F5344CB8AC3E}">
-        <p14:creationId xmlns:p14="http://schemas.microsoft.com/office/powerpoint/2010/main" val="3618446972"/>
-      </p:ext>
-    </p:extLst>
-  </p:cSld>
-  <p:clrMapOvr>
-    <a:masterClrMapping/>
-  </p:clrMapOvr>
-  <mc:AlternateContent xmlns:mc="http://schemas.openxmlformats.org/markup-compatibility/2006" xmlns:p14="http://schemas.microsoft.com/office/powerpoint/2010/main">
-    <mc:Choice Requires="p14">
-      <p:transition p14:dur="250">
-        <p:fade/>
-      </p:transition>
-    </mc:Choice>
-    <mc:Fallback xmlns="">
-      <p:transition>
-        <p:fade/>
-      </p:transition>
-    </mc:Fallback>
-  </mc:AlternateContent>
-</p:sld>
-</file>
-
-<file path=ppt/slides/slide16.xml><?xml version="1.0" encoding="utf-8"?>
-<p:sld xmlns:a="http://schemas.openxmlformats.org/drawingml/2006/main" xmlns:r="http://schemas.openxmlformats.org/officeDocument/2006/relationships" xmlns:p="http://schemas.openxmlformats.org/presentationml/2006/main">
-  <p:cSld>
-    <p:spTree>
-      <p:nvGrpSpPr>
-        <p:cNvPr id="1" name=""/>
-        <p:cNvGrpSpPr/>
-        <p:nvPr/>
-      </p:nvGrpSpPr>
-      <p:grpSpPr>
-        <a:xfrm>
-          <a:off x="0" y="0"/>
-          <a:ext cx="0" cy="0"/>
-          <a:chOff x="0" y="0"/>
-          <a:chExt cx="0" cy="0"/>
-        </a:xfrm>
-      </p:grpSpPr>
-      <p:sp>
-        <p:nvSpPr>
-          <p:cNvPr id="2" name="Nexus:html_header">
-            <a:extLst>
-              <a:ext uri="{FF2B5EF4-FFF2-40B4-BE49-F238E27FC236}">
-                <a16:creationId xmlns:a16="http://schemas.microsoft.com/office/drawing/2014/main" id="{3A736A6A-BF83-0A19-C4EF-EB0AB0A1AF5B}"/>
-              </a:ext>
-            </a:extLst>
-          </p:cNvPr>
-          <p:cNvSpPr>
-            <a:spLocks noGrp="1"/>
-          </p:cNvSpPr>
-          <p:nvPr>
-            <p:ph type="title"/>
-          </p:nvPr>
-        </p:nvSpPr>
-        <p:spPr/>
-        <p:txBody>
-          <a:bodyPr/>
-          <a:lstStyle/>
-          <a:p>
-            <a:endParaRPr lang="en-US"/>
-          </a:p>
-        </p:txBody>
-      </p:sp>
-      <p:sp>
-        <p:nvSpPr>
-          <p:cNvPr id="3" name="Slide Number Placeholder 2">
-            <a:extLst>
-              <a:ext uri="{FF2B5EF4-FFF2-40B4-BE49-F238E27FC236}">
-                <a16:creationId xmlns:a16="http://schemas.microsoft.com/office/drawing/2014/main" id="{414F000A-EBAB-7068-40AD-E9539185E99B}"/>
-              </a:ext>
-            </a:extLst>
-          </p:cNvPr>
-          <p:cNvSpPr>
-            <a:spLocks noGrp="1"/>
-          </p:cNvSpPr>
-          <p:nvPr>
-            <p:ph type="sldNum" sz="quarter" idx="10"/>
-          </p:nvPr>
-        </p:nvSpPr>
-        <p:spPr/>
-        <p:txBody>
-          <a:bodyPr/>
-          <a:lstStyle/>
-          <a:p>
-            <a:fld id="{F0D23093-2AB0-F74C-B865-1A12A15B650E}" type="slidenum">
-              <a:rPr lang="en-US" smtClean="0"/>
-              <a:pPr/>
-              <a:t>16</a:t>
-            </a:fld>
-            <a:endParaRPr lang="en-US" dirty="0"/>
-          </a:p>
-        </p:txBody>
-      </p:sp>
-      <p:sp>
-        <p:nvSpPr>
-          <p:cNvPr id="4" name="Nexus:toc_link">
-            <a:extLst>
-              <a:ext uri="{FF2B5EF4-FFF2-40B4-BE49-F238E27FC236}">
-                <a16:creationId xmlns:a16="http://schemas.microsoft.com/office/drawing/2014/main" id="{30B93E90-0E08-FD2A-E06E-EAABA53F2BA5}"/>
-              </a:ext>
-            </a:extLst>
-          </p:cNvPr>
-          <p:cNvSpPr>
-            <a:spLocks noGrp="1"/>
-          </p:cNvSpPr>
-          <p:nvPr>
-            <p:ph type="body" sz="quarter" idx="12"/>
-          </p:nvPr>
-        </p:nvSpPr>
-        <p:spPr/>
-        <p:txBody>
-          <a:bodyPr>
-            <a:normAutofit fontScale="55000" lnSpcReduction="20000"/>
-          </a:bodyPr>
-          <a:lstStyle/>
-          <a:p>
-            <a:endParaRPr lang="en-US"/>
-          </a:p>
-        </p:txBody>
-      </p:sp>
-      <p:sp>
-        <p:nvSpPr>
-          <p:cNvPr id="8" name="Nexus:breadcrumbs">
-            <a:extLst>
-              <a:ext uri="{FF2B5EF4-FFF2-40B4-BE49-F238E27FC236}">
-                <a16:creationId xmlns:a16="http://schemas.microsoft.com/office/drawing/2014/main" id="{6657C1BC-CFCB-8D4E-9E5F-493EC82D394B}"/>
-              </a:ext>
-            </a:extLst>
-          </p:cNvPr>
-          <p:cNvSpPr>
-            <a:spLocks noGrp="1"/>
-          </p:cNvSpPr>
-          <p:nvPr>
-            <p:ph type="body" sz="quarter" idx="13"/>
-          </p:nvPr>
-        </p:nvSpPr>
-        <p:spPr/>
-        <p:txBody>
-          <a:bodyPr>
-            <a:normAutofit fontScale="55000" lnSpcReduction="20000"/>
-          </a:bodyPr>
-          <a:lstStyle/>
-          <a:p>
-            <a:endParaRPr lang="en-US"/>
-          </a:p>
-        </p:txBody>
-      </p:sp>
-      <p:sp>
-        <p:nvSpPr>
-          <p:cNvPr id="9" name="Nexus:comments">
-            <a:extLst>
-              <a:ext uri="{FF2B5EF4-FFF2-40B4-BE49-F238E27FC236}">
-                <a16:creationId xmlns:a16="http://schemas.microsoft.com/office/drawing/2014/main" id="{98CD9217-8B82-E737-2B3F-8131D1BC4902}"/>
-              </a:ext>
-            </a:extLst>
-          </p:cNvPr>
-          <p:cNvSpPr>
-            <a:spLocks noGrp="1"/>
-          </p:cNvSpPr>
-          <p:nvPr>
-            <p:ph type="body" sz="quarter" idx="14"/>
-          </p:nvPr>
-        </p:nvSpPr>
-        <p:spPr/>
-        <p:txBody>
-          <a:bodyPr/>
-          <a:lstStyle/>
-          <a:p>
-            <a:endParaRPr lang="en-US"/>
-          </a:p>
-        </p:txBody>
-      </p:sp>
-    </p:spTree>
-    <p:extLst>
-      <p:ext uri="{BB962C8B-B14F-4D97-AF65-F5344CB8AC3E}">
-        <p14:creationId xmlns:p14="http://schemas.microsoft.com/office/powerpoint/2010/main" val="2407194001"/>
-      </p:ext>
-    </p:extLst>
-  </p:cSld>
-  <p:clrMapOvr>
-    <a:masterClrMapping/>
-  </p:clrMapOvr>
-  <mc:AlternateContent xmlns:mc="http://schemas.openxmlformats.org/markup-compatibility/2006" xmlns:p14="http://schemas.microsoft.com/office/powerpoint/2010/main">
-    <mc:Choice Requires="p14">
-      <p:transition p14:dur="250">
-        <p:fade/>
-      </p:transition>
-    </mc:Choice>
-    <mc:Fallback xmlns="">
-      <p:transition>
-        <p:fade/>
-      </p:transition>
-    </mc:Fallback>
-  </mc:AlternateContent>
-</p:sld>
-</file>
-
-<file path=ppt/slides/slide17.xml><?xml version="1.0" encoding="utf-8"?>
-<p:sld xmlns:a="http://schemas.openxmlformats.org/drawingml/2006/main" xmlns:r="http://schemas.openxmlformats.org/officeDocument/2006/relationships" xmlns:p="http://schemas.openxmlformats.org/presentationml/2006/main">
-  <p:cSld>
-    <p:spTree>
-      <p:nvGrpSpPr>
-        <p:cNvPr id="1" name=""/>
-        <p:cNvGrpSpPr/>
-        <p:nvPr/>
-      </p:nvGrpSpPr>
-      <p:grpSpPr>
-        <a:xfrm>
-          <a:off x="0" y="0"/>
-          <a:ext cx="0" cy="0"/>
-          <a:chOff x="0" y="0"/>
-          <a:chExt cx="0" cy="0"/>
-        </a:xfrm>
-      </p:grpSpPr>
-      <p:sp>
-        <p:nvSpPr>
-          <p:cNvPr id="3" name="Slide Number Placeholder 2">
-            <a:extLst>
-              <a:ext uri="{FF2B5EF4-FFF2-40B4-BE49-F238E27FC236}">
-                <a16:creationId xmlns:a16="http://schemas.microsoft.com/office/drawing/2014/main" id="{0FB483A2-76AF-4DBF-9017-06B493C33173}"/>
-              </a:ext>
-            </a:extLst>
-          </p:cNvPr>
-          <p:cNvSpPr>
-            <a:spLocks noGrp="1"/>
-          </p:cNvSpPr>
-          <p:nvPr>
-            <p:ph type="sldNum" sz="quarter" idx="10"/>
-          </p:nvPr>
-        </p:nvSpPr>
-        <p:spPr/>
-        <p:txBody>
-          <a:bodyPr/>
-          <a:lstStyle/>
-          <a:p>
-            <a:fld id="{F0D23093-2AB0-F74C-B865-1A12A15B650E}" type="slidenum">
-              <a:rPr lang="en-US" smtClean="0"/>
-              <a:pPr/>
-              <a:t>17</a:t>
-            </a:fld>
-            <a:endParaRPr lang="en-US" dirty="0"/>
-          </a:p>
-        </p:txBody>
-      </p:sp>
-      <p:sp>
-        <p:nvSpPr>
-          <p:cNvPr id="2" name="Nexus:query=A|i_type|cont|file;A|i_name|cont|session">
-            <a:extLst>
-              <a:ext uri="{FF2B5EF4-FFF2-40B4-BE49-F238E27FC236}">
-                <a16:creationId xmlns:a16="http://schemas.microsoft.com/office/drawing/2014/main" id="{6354F7CA-CFB0-10BE-39D1-A4406787371F}"/>
-              </a:ext>
-            </a:extLst>
-          </p:cNvPr>
-          <p:cNvSpPr>
-            <a:spLocks noGrp="1"/>
-          </p:cNvSpPr>
-          <p:nvPr>
-            <p:ph type="pic" sz="quarter" idx="11"/>
-          </p:nvPr>
-        </p:nvSpPr>
-        <p:spPr/>
-        <p:txBody>
-          <a:bodyPr/>
-          <a:lstStyle/>
-          <a:p>
-            <a:endParaRPr lang="en-US"/>
-          </a:p>
-        </p:txBody>
-      </p:sp>
-      <p:sp>
-        <p:nvSpPr>
-          <p:cNvPr id="4" name="Nexus:query=A|i_type|cont|image;A|i_name|cont|logo;">
-            <a:extLst>
-              <a:ext uri="{FF2B5EF4-FFF2-40B4-BE49-F238E27FC236}">
-                <a16:creationId xmlns:a16="http://schemas.microsoft.com/office/drawing/2014/main" id="{A6F80112-291C-8E81-377F-3579177E40F5}"/>
-              </a:ext>
-            </a:extLst>
-          </p:cNvPr>
-          <p:cNvSpPr>
-            <a:spLocks noGrp="1"/>
-          </p:cNvSpPr>
-          <p:nvPr>
-            <p:ph type="pic" sz="quarter" idx="12"/>
-          </p:nvPr>
-        </p:nvSpPr>
-        <p:spPr/>
-        <p:txBody>
-          <a:bodyPr>
-            <a:normAutofit fontScale="55000" lnSpcReduction="20000"/>
-          </a:bodyPr>
-          <a:lstStyle/>
-          <a:p>
-            <a:endParaRPr lang="en-US"/>
-          </a:p>
-        </p:txBody>
-      </p:sp>
-    </p:spTree>
-    <p:extLst>
-      <p:ext uri="{BB962C8B-B14F-4D97-AF65-F5344CB8AC3E}">
-        <p14:creationId xmlns:p14="http://schemas.microsoft.com/office/powerpoint/2010/main" val="416096387"/>
-      </p:ext>
-    </p:extLst>
-  </p:cSld>
-  <p:clrMapOvr>
-    <a:masterClrMapping/>
-  </p:clrMapOvr>
-  <mc:AlternateContent xmlns:mc="http://schemas.openxmlformats.org/markup-compatibility/2006" xmlns:p14="http://schemas.microsoft.com/office/powerpoint/2010/main">
-    <mc:Choice Requires="p14">
-      <p:transition p14:dur="250">
-        <p:fade/>
-      </p:transition>
-    </mc:Choice>
-    <mc:Fallback xmlns="">
-      <p:transition>
-        <p:fade/>
-      </p:transition>
-    </mc:Fallback>
-  </mc:AlternateContent>
-</p:sld>
-</file>
-
-<file path=ppt/slides/slide18.xml><?xml version="1.0" encoding="utf-8"?>
-<p:sld xmlns:a="http://schemas.openxmlformats.org/drawingml/2006/main" xmlns:r="http://schemas.openxmlformats.org/officeDocument/2006/relationships" xmlns:p="http://schemas.openxmlformats.org/presentationml/2006/main">
-  <p:cSld>
-    <p:spTree>
-      <p:nvGrpSpPr>
-        <p:cNvPr id="1" name=""/>
-        <p:cNvGrpSpPr/>
-        <p:nvPr/>
-      </p:nvGrpSpPr>
-      <p:grpSpPr>
-        <a:xfrm>
-          <a:off x="0" y="0"/>
-          <a:ext cx="0" cy="0"/>
-          <a:chOff x="0" y="0"/>
-          <a:chExt cx="0" cy="0"/>
-        </a:xfrm>
-      </p:grpSpPr>
-      <p:sp>
-        <p:nvSpPr>
-          <p:cNvPr id="3" name="Nexus:html_header">
-            <a:extLst>
-              <a:ext uri="{FF2B5EF4-FFF2-40B4-BE49-F238E27FC236}">
-                <a16:creationId xmlns:a16="http://schemas.microsoft.com/office/drawing/2014/main" id="{4526C87E-ABEF-30AA-5BE9-EF8B4A341F8D}"/>
-              </a:ext>
-            </a:extLst>
-          </p:cNvPr>
-          <p:cNvSpPr>
-            <a:spLocks noGrp="1"/>
-          </p:cNvSpPr>
-          <p:nvPr>
-            <p:ph type="title"/>
-          </p:nvPr>
-        </p:nvSpPr>
-        <p:spPr/>
-        <p:txBody>
-          <a:bodyPr/>
-          <a:lstStyle/>
-          <a:p>
-            <a:endParaRPr lang="en-US"/>
-          </a:p>
-        </p:txBody>
-      </p:sp>
-      <p:sp>
-        <p:nvSpPr>
-          <p:cNvPr id="2" name="Slide Number Placeholder 1">
-            <a:extLst>
-              <a:ext uri="{FF2B5EF4-FFF2-40B4-BE49-F238E27FC236}">
-                <a16:creationId xmlns:a16="http://schemas.microsoft.com/office/drawing/2014/main" id="{994E41D7-97E0-66AC-8996-D582A13BA5CE}"/>
-              </a:ext>
-            </a:extLst>
-          </p:cNvPr>
-          <p:cNvSpPr>
-            <a:spLocks noGrp="1"/>
-          </p:cNvSpPr>
-          <p:nvPr>
-            <p:ph type="sldNum" sz="quarter" idx="10"/>
-          </p:nvPr>
-        </p:nvSpPr>
-        <p:spPr/>
-        <p:txBody>
-          <a:bodyPr/>
-          <a:lstStyle/>
-          <a:p>
-            <a:fld id="{F0D23093-2AB0-F74C-B865-1A12A15B650E}" type="slidenum">
-              <a:rPr lang="en-US" smtClean="0"/>
-              <a:pPr/>
-              <a:t>18</a:t>
-            </a:fld>
-            <a:endParaRPr lang="en-US" dirty="0"/>
-          </a:p>
-        </p:txBody>
-      </p:sp>
-      <p:sp>
-        <p:nvSpPr>
-          <p:cNvPr id="7" name="Nexus:query=A|i_tags|cont|imgcmp&amp;sequence=0">
-            <a:extLst>
-              <a:ext uri="{FF2B5EF4-FFF2-40B4-BE49-F238E27FC236}">
-                <a16:creationId xmlns:a16="http://schemas.microsoft.com/office/drawing/2014/main" id="{C969FE4C-C99D-EAA8-7EA0-8D8C62A8F3B1}"/>
-              </a:ext>
-            </a:extLst>
-          </p:cNvPr>
-          <p:cNvSpPr>
-            <a:spLocks noGrp="1"/>
-          </p:cNvSpPr>
-          <p:nvPr>
-            <p:ph type="pic" sz="quarter" idx="11"/>
-          </p:nvPr>
-        </p:nvSpPr>
-        <p:spPr/>
-        <p:txBody>
-          <a:bodyPr/>
-          <a:lstStyle/>
-          <a:p>
-            <a:endParaRPr lang="en-US"/>
-          </a:p>
-        </p:txBody>
-      </p:sp>
-      <p:sp>
-        <p:nvSpPr>
-          <p:cNvPr id="8" name="Nexus:query=A|i_tags|cont|imgcmp&amp;sequence=1">
-            <a:extLst>
-              <a:ext uri="{FF2B5EF4-FFF2-40B4-BE49-F238E27FC236}">
-                <a16:creationId xmlns:a16="http://schemas.microsoft.com/office/drawing/2014/main" id="{61BEA5F6-F7E2-EB6B-F080-C5C088141F4B}"/>
-              </a:ext>
-            </a:extLst>
-          </p:cNvPr>
-          <p:cNvSpPr>
-            <a:spLocks noGrp="1"/>
-          </p:cNvSpPr>
-          <p:nvPr>
-            <p:ph type="pic" sz="quarter" idx="12"/>
-          </p:nvPr>
-        </p:nvSpPr>
-        <p:spPr/>
-        <p:txBody>
-          <a:bodyPr/>
-          <a:lstStyle/>
-          <a:p>
-            <a:endParaRPr lang="en-US"/>
-          </a:p>
-        </p:txBody>
-      </p:sp>
-    </p:spTree>
-    <p:extLst>
-      <p:ext uri="{BB962C8B-B14F-4D97-AF65-F5344CB8AC3E}">
-        <p14:creationId xmlns:p14="http://schemas.microsoft.com/office/powerpoint/2010/main" val="1425914728"/>
-      </p:ext>
-    </p:extLst>
-  </p:cSld>
-  <p:clrMapOvr>
-    <a:masterClrMapping/>
-  </p:clrMapOvr>
-  <mc:AlternateContent xmlns:mc="http://schemas.openxmlformats.org/markup-compatibility/2006" xmlns:p14="http://schemas.microsoft.com/office/powerpoint/2010/main">
-    <mc:Choice Requires="p14">
-      <p:transition p14:dur="250">
-        <p:fade/>
-      </p:transition>
-    </mc:Choice>
-    <mc:Fallback xmlns="">
-      <p:transition>
-        <p:fade/>
-      </p:transition>
-    </mc:Fallback>
-  </mc:AlternateContent>
-</p:sld>
-</file>
-
-<file path=ppt/slides/slide19.xml><?xml version="1.0" encoding="utf-8"?>
-<p:sld xmlns:a="http://schemas.openxmlformats.org/drawingml/2006/main" xmlns:r="http://schemas.openxmlformats.org/officeDocument/2006/relationships" xmlns:p="http://schemas.openxmlformats.org/presentationml/2006/main">
-  <p:cSld>
-    <p:spTree>
-      <p:nvGrpSpPr>
-        <p:cNvPr id="1" name=""/>
-        <p:cNvGrpSpPr/>
-        <p:nvPr/>
-      </p:nvGrpSpPr>
-      <p:grpSpPr>
-        <a:xfrm>
-          <a:off x="0" y="0"/>
-          <a:ext cx="0" cy="0"/>
-          <a:chOff x="0" y="0"/>
-          <a:chExt cx="0" cy="0"/>
-        </a:xfrm>
-      </p:grpSpPr>
-      <p:sp>
-        <p:nvSpPr>
-          <p:cNvPr id="5" name="Nexus:query=A|i_name|eq|end_text">
-            <a:extLst>
-              <a:ext uri="{FF2B5EF4-FFF2-40B4-BE49-F238E27FC236}">
-                <a16:creationId xmlns:a16="http://schemas.microsoft.com/office/drawing/2014/main" id="{254AA6FA-C9CF-2086-C8D9-715AAA64E2D5}"/>
-              </a:ext>
-            </a:extLst>
-          </p:cNvPr>
-          <p:cNvSpPr>
-            <a:spLocks noGrp="1"/>
-          </p:cNvSpPr>
-          <p:nvPr>
-            <p:ph type="body" sz="quarter" idx="10"/>
-          </p:nvPr>
-        </p:nvSpPr>
-        <p:spPr/>
-        <p:txBody>
-          <a:bodyPr/>
-          <a:lstStyle/>
-          <a:p>
-            <a:endParaRPr lang="en-US"/>
-          </a:p>
-        </p:txBody>
-      </p:sp>
-      <p:sp>
-        <p:nvSpPr>
-          <p:cNvPr id="6" name="Nexus:query=A|i_type|cont|image;A|i_name|cont|logo">
-            <a:extLst>
-              <a:ext uri="{FF2B5EF4-FFF2-40B4-BE49-F238E27FC236}">
-                <a16:creationId xmlns:a16="http://schemas.microsoft.com/office/drawing/2014/main" id="{9C8D8697-5017-E0B5-6902-11BA9029E0C5}"/>
-              </a:ext>
-            </a:extLst>
-          </p:cNvPr>
-          <p:cNvSpPr>
-            <a:spLocks noGrp="1"/>
-          </p:cNvSpPr>
-          <p:nvPr>
-            <p:ph type="pic" sz="quarter" idx="11"/>
-          </p:nvPr>
-        </p:nvSpPr>
-        <p:spPr/>
-        <p:txBody>
-          <a:bodyPr/>
-          <a:lstStyle/>
-          <a:p>
-            <a:endParaRPr lang="en-US"/>
-          </a:p>
-        </p:txBody>
-      </p:sp>
-    </p:spTree>
-    <p:extLst>
-      <p:ext uri="{BB962C8B-B14F-4D97-AF65-F5344CB8AC3E}">
-        <p14:creationId xmlns:p14="http://schemas.microsoft.com/office/powerpoint/2010/main" val="746989477"/>
-      </p:ext>
-    </p:extLst>
-  </p:cSld>
-  <p:clrMapOvr>
-    <a:masterClrMapping/>
-  </p:clrMapOvr>
-  <mc:AlternateContent xmlns:mc="http://schemas.openxmlformats.org/markup-compatibility/2006" xmlns:p14="http://schemas.microsoft.com/office/powerpoint/2010/main">
-    <mc:Choice Requires="p14">
-      <p:transition p14:dur="250">
-        <p:fade/>
-      </p:transition>
-    </mc:Choice>
-    <mc:Fallback xmlns="">
-      <p:transition>
-        <p:fade/>
-      </p:transition>
-    </mc:Fallback>
-  </mc:AlternateContent>
-</p:sld>
-</file>
-
 <file path=ppt/slides/slide2.xml><?xml version="1.0" encoding="utf-8"?>
 <p:sld xmlns:a="http://schemas.openxmlformats.org/drawingml/2006/main" xmlns:r="http://schemas.openxmlformats.org/officeDocument/2006/relationships" xmlns:p="http://schemas.openxmlformats.org/presentationml/2006/main">
   <p:cSld>
@@ -5802,10 +4393,10 @@
       </p:grpSpPr>
       <p:sp>
         <p:nvSpPr>
-          <p:cNvPr id="7" name="Nexus:query=A|i_name|eq|html_title">
-            <a:extLst>
-              <a:ext uri="{FF2B5EF4-FFF2-40B4-BE49-F238E27FC236}">
-                <a16:creationId xmlns:a16="http://schemas.microsoft.com/office/drawing/2014/main" id="{4B8B588C-2DD0-99CF-A151-85400C0AFD6A}"/>
+          <p:cNvPr id="9" name="Nexus:html_header">
+            <a:extLst>
+              <a:ext uri="{FF2B5EF4-FFF2-40B4-BE49-F238E27FC236}">
+                <a16:creationId xmlns:a16="http://schemas.microsoft.com/office/drawing/2014/main" id="{16CCA0BC-37AC-9B82-80E1-B4DD726934BB}"/>
               </a:ext>
             </a:extLst>
           </p:cNvPr>
@@ -5830,7 +4421,7 @@
           <p:cNvPr id="3" name="Slide Number Placeholder 2">
             <a:extLst>
               <a:ext uri="{FF2B5EF4-FFF2-40B4-BE49-F238E27FC236}">
-                <a16:creationId xmlns:a16="http://schemas.microsoft.com/office/drawing/2014/main" id="{324937C6-EC74-4836-8B95-52CFA36DF4C7}"/>
+                <a16:creationId xmlns:a16="http://schemas.microsoft.com/office/drawing/2014/main" id="{4E31EF83-8190-2382-481F-E16B32C1159B}"/>
               </a:ext>
             </a:extLst>
           </p:cNvPr>
@@ -5857,18 +4448,18 @@
       </p:sp>
       <p:sp>
         <p:nvSpPr>
-          <p:cNvPr id="8" name="Nexus:query=A|i_name|eq|html">
-            <a:extLst>
-              <a:ext uri="{FF2B5EF4-FFF2-40B4-BE49-F238E27FC236}">
-                <a16:creationId xmlns:a16="http://schemas.microsoft.com/office/drawing/2014/main" id="{7DD66B13-AB39-5CC9-081C-5E8EDF1CB81F}"/>
-              </a:ext>
-            </a:extLst>
-          </p:cNvPr>
-          <p:cNvSpPr>
-            <a:spLocks noGrp="1"/>
-          </p:cNvSpPr>
-          <p:nvPr>
-            <p:ph type="body" sz="quarter" idx="11"/>
+          <p:cNvPr id="10" name="Nexus:query=A|i_name|eq|table&amp;rows=6&amp;cols=5">
+            <a:extLst>
+              <a:ext uri="{FF2B5EF4-FFF2-40B4-BE49-F238E27FC236}">
+                <a16:creationId xmlns:a16="http://schemas.microsoft.com/office/drawing/2014/main" id="{64666E78-EA83-3B01-37B8-CFB2AA38A1A5}"/>
+              </a:ext>
+            </a:extLst>
+          </p:cNvPr>
+          <p:cNvSpPr>
+            <a:spLocks noGrp="1"/>
+          </p:cNvSpPr>
+          <p:nvPr>
+            <p:ph type="tbl" sz="quarter" idx="11"/>
           </p:nvPr>
         </p:nvSpPr>
         <p:spPr/>
@@ -5882,18 +4473,18 @@
       </p:sp>
       <p:sp>
         <p:nvSpPr>
-          <p:cNvPr id="9" name="Nexus:breadcrumbs">
-            <a:extLst>
-              <a:ext uri="{FF2B5EF4-FFF2-40B4-BE49-F238E27FC236}">
-                <a16:creationId xmlns:a16="http://schemas.microsoft.com/office/drawing/2014/main" id="{7A0EB23B-3DFB-C77E-47DB-ADFEA8768B35}"/>
-              </a:ext>
-            </a:extLst>
-          </p:cNvPr>
-          <p:cNvSpPr>
-            <a:spLocks noGrp="1"/>
-          </p:cNvSpPr>
-          <p:nvPr>
-            <p:ph type="body" sz="quarter" idx="13"/>
+          <p:cNvPr id="5" name="Nexus:toc_link">
+            <a:extLst>
+              <a:ext uri="{FF2B5EF4-FFF2-40B4-BE49-F238E27FC236}">
+                <a16:creationId xmlns:a16="http://schemas.microsoft.com/office/drawing/2014/main" id="{0E90428C-6670-BD74-1BB8-BFAE8E455207}"/>
+              </a:ext>
+            </a:extLst>
+          </p:cNvPr>
+          <p:cNvSpPr>
+            <a:spLocks noGrp="1"/>
+          </p:cNvSpPr>
+          <p:nvPr>
+            <p:ph type="body" sz="quarter" idx="12"/>
           </p:nvPr>
         </p:nvSpPr>
         <p:spPr/>
@@ -5903,14 +4494,17 @@
           </a:bodyPr>
           <a:lstStyle/>
           <a:p>
-            <a:endParaRPr lang="en-US"/>
+            <a:r>
+              <a:rPr lang="en-US" dirty="0"/>
+              <a:t>TOC</a:t>
+            </a:r>
           </a:p>
         </p:txBody>
       </p:sp>
     </p:spTree>
     <p:extLst>
       <p:ext uri="{BB962C8B-B14F-4D97-AF65-F5344CB8AC3E}">
-        <p14:creationId xmlns:p14="http://schemas.microsoft.com/office/powerpoint/2010/main" val="1758243780"/>
+        <p14:creationId xmlns:p14="http://schemas.microsoft.com/office/powerpoint/2010/main" val="2950471175"/>
       </p:ext>
     </p:extLst>
   </p:cSld>
@@ -5951,10 +4545,35 @@
       </p:grpSpPr>
       <p:sp>
         <p:nvSpPr>
-          <p:cNvPr id="2" name="Slide Number Placeholder 1">
-            <a:extLst>
-              <a:ext uri="{FF2B5EF4-FFF2-40B4-BE49-F238E27FC236}">
-                <a16:creationId xmlns:a16="http://schemas.microsoft.com/office/drawing/2014/main" id="{8C6DEB4E-4D1F-9B87-2F2B-749DD9EBE568}"/>
+          <p:cNvPr id="5" name="Nexus:query=A|i_name|eq|tree_title">
+            <a:extLst>
+              <a:ext uri="{FF2B5EF4-FFF2-40B4-BE49-F238E27FC236}">
+                <a16:creationId xmlns:a16="http://schemas.microsoft.com/office/drawing/2014/main" id="{1269C953-8836-49F2-8EC7-4047D1C73857}"/>
+              </a:ext>
+            </a:extLst>
+          </p:cNvPr>
+          <p:cNvSpPr>
+            <a:spLocks noGrp="1"/>
+          </p:cNvSpPr>
+          <p:nvPr>
+            <p:ph type="title"/>
+          </p:nvPr>
+        </p:nvSpPr>
+        <p:spPr/>
+        <p:txBody>
+          <a:bodyPr/>
+          <a:lstStyle/>
+          <a:p>
+            <a:endParaRPr lang="en-US" dirty="0"/>
+          </a:p>
+        </p:txBody>
+      </p:sp>
+      <p:sp>
+        <p:nvSpPr>
+          <p:cNvPr id="3" name="Slide Number Placeholder 2">
+            <a:extLst>
+              <a:ext uri="{FF2B5EF4-FFF2-40B4-BE49-F238E27FC236}">
+                <a16:creationId xmlns:a16="http://schemas.microsoft.com/office/drawing/2014/main" id="{73CF9F6C-0422-4E16-99CF-0A2C6203AF55}"/>
               </a:ext>
             </a:extLst>
           </p:cNvPr>
@@ -5974,868 +4593,6 @@
               <a:rPr lang="en-US" smtClean="0"/>
               <a:pPr/>
               <a:t>4</a:t>
-            </a:fld>
-            <a:endParaRPr lang="en-US" dirty="0"/>
-          </a:p>
-        </p:txBody>
-      </p:sp>
-      <p:sp>
-        <p:nvSpPr>
-          <p:cNvPr id="7" name="Nexus:query=A|i_name|eq|image">
-            <a:extLst>
-              <a:ext uri="{FF2B5EF4-FFF2-40B4-BE49-F238E27FC236}">
-                <a16:creationId xmlns:a16="http://schemas.microsoft.com/office/drawing/2014/main" id="{23FFAF24-9585-1BC0-DC9E-F40D17B5C11C}"/>
-              </a:ext>
-            </a:extLst>
-          </p:cNvPr>
-          <p:cNvSpPr>
-            <a:spLocks noGrp="1"/>
-          </p:cNvSpPr>
-          <p:nvPr>
-            <p:ph type="pic" sz="quarter" idx="11"/>
-          </p:nvPr>
-        </p:nvSpPr>
-        <p:spPr/>
-        <p:txBody>
-          <a:bodyPr/>
-          <a:lstStyle/>
-          <a:p>
-            <a:endParaRPr lang="en-US"/>
-          </a:p>
-        </p:txBody>
-      </p:sp>
-      <p:sp>
-        <p:nvSpPr>
-          <p:cNvPr id="6" name="Nexus:query=A|i_name|eq|image_title">
-            <a:extLst>
-              <a:ext uri="{FF2B5EF4-FFF2-40B4-BE49-F238E27FC236}">
-                <a16:creationId xmlns:a16="http://schemas.microsoft.com/office/drawing/2014/main" id="{5430DE96-8572-AC7F-67AE-6B038A107F81}"/>
-              </a:ext>
-            </a:extLst>
-          </p:cNvPr>
-          <p:cNvSpPr>
-            <a:spLocks noGrp="1"/>
-          </p:cNvSpPr>
-          <p:nvPr>
-            <p:ph type="title"/>
-          </p:nvPr>
-        </p:nvSpPr>
-        <p:spPr/>
-        <p:txBody>
-          <a:bodyPr/>
-          <a:lstStyle/>
-          <a:p>
-            <a:endParaRPr lang="en-US"/>
-          </a:p>
-        </p:txBody>
-      </p:sp>
-      <p:sp>
-        <p:nvSpPr>
-          <p:cNvPr id="8" name="Nexus:toc_link&amp;query=A|i_name|eq|toc_link_text">
-            <a:extLst>
-              <a:ext uri="{FF2B5EF4-FFF2-40B4-BE49-F238E27FC236}">
-                <a16:creationId xmlns:a16="http://schemas.microsoft.com/office/drawing/2014/main" id="{63CBCDB3-5755-989D-D524-AF29E5335CB6}"/>
-              </a:ext>
-            </a:extLst>
-          </p:cNvPr>
-          <p:cNvSpPr>
-            <a:spLocks noGrp="1"/>
-          </p:cNvSpPr>
-          <p:nvPr>
-            <p:ph type="body" sz="quarter" idx="12"/>
-          </p:nvPr>
-        </p:nvSpPr>
-        <p:spPr/>
-        <p:txBody>
-          <a:bodyPr>
-            <a:normAutofit fontScale="55000" lnSpcReduction="20000"/>
-          </a:bodyPr>
-          <a:lstStyle/>
-          <a:p>
-            <a:endParaRPr lang="en-US" dirty="0"/>
-          </a:p>
-        </p:txBody>
-      </p:sp>
-    </p:spTree>
-    <p:extLst>
-      <p:ext uri="{BB962C8B-B14F-4D97-AF65-F5344CB8AC3E}">
-        <p14:creationId xmlns:p14="http://schemas.microsoft.com/office/powerpoint/2010/main" val="566356191"/>
-      </p:ext>
-    </p:extLst>
-  </p:cSld>
-  <p:clrMapOvr>
-    <a:masterClrMapping/>
-  </p:clrMapOvr>
-  <mc:AlternateContent xmlns:mc="http://schemas.openxmlformats.org/markup-compatibility/2006" xmlns:p14="http://schemas.microsoft.com/office/powerpoint/2010/main">
-    <mc:Choice Requires="p14">
-      <p:transition p14:dur="250">
-        <p:fade/>
-      </p:transition>
-    </mc:Choice>
-    <mc:Fallback xmlns="">
-      <p:transition>
-        <p:fade/>
-      </p:transition>
-    </mc:Fallback>
-  </mc:AlternateContent>
-</p:sld>
-</file>
-
-<file path=ppt/slides/slide5.xml><?xml version="1.0" encoding="utf-8"?>
-<p:sld xmlns:a="http://schemas.openxmlformats.org/drawingml/2006/main" xmlns:r="http://schemas.openxmlformats.org/officeDocument/2006/relationships" xmlns:p="http://schemas.openxmlformats.org/presentationml/2006/main">
-  <p:cSld>
-    <p:spTree>
-      <p:nvGrpSpPr>
-        <p:cNvPr id="1" name=""/>
-        <p:cNvGrpSpPr/>
-        <p:nvPr/>
-      </p:nvGrpSpPr>
-      <p:grpSpPr>
-        <a:xfrm>
-          <a:off x="0" y="0"/>
-          <a:ext cx="0" cy="0"/>
-          <a:chOff x="0" y="0"/>
-          <a:chExt cx="0" cy="0"/>
-        </a:xfrm>
-      </p:grpSpPr>
-      <p:sp>
-        <p:nvSpPr>
-          <p:cNvPr id="2" name="Nexus:query=A|i_name|cont|html-anim-title;">
-            <a:extLst>
-              <a:ext uri="{FF2B5EF4-FFF2-40B4-BE49-F238E27FC236}">
-                <a16:creationId xmlns:a16="http://schemas.microsoft.com/office/drawing/2014/main" id="{14EB1C4C-2AC1-71D0-A16B-D2E4240F42C6}"/>
-              </a:ext>
-            </a:extLst>
-          </p:cNvPr>
-          <p:cNvSpPr>
-            <a:spLocks noGrp="1"/>
-          </p:cNvSpPr>
-          <p:nvPr>
-            <p:ph type="title"/>
-          </p:nvPr>
-        </p:nvSpPr>
-        <p:spPr/>
-        <p:txBody>
-          <a:bodyPr/>
-          <a:lstStyle/>
-          <a:p>
-            <a:endParaRPr lang="en-US"/>
-          </a:p>
-        </p:txBody>
-      </p:sp>
-      <p:sp>
-        <p:nvSpPr>
-          <p:cNvPr id="3" name="Slide Number Placeholder 2">
-            <a:extLst>
-              <a:ext uri="{FF2B5EF4-FFF2-40B4-BE49-F238E27FC236}">
-                <a16:creationId xmlns:a16="http://schemas.microsoft.com/office/drawing/2014/main" id="{4D58F91F-C0E1-346D-807D-2CEA4DC38FCE}"/>
-              </a:ext>
-            </a:extLst>
-          </p:cNvPr>
-          <p:cNvSpPr>
-            <a:spLocks noGrp="1"/>
-          </p:cNvSpPr>
-          <p:nvPr>
-            <p:ph type="sldNum" sz="quarter" idx="10"/>
-          </p:nvPr>
-        </p:nvSpPr>
-        <p:spPr/>
-        <p:txBody>
-          <a:bodyPr/>
-          <a:lstStyle/>
-          <a:p>
-            <a:fld id="{F0D23093-2AB0-F74C-B865-1A12A15B650E}" type="slidenum">
-              <a:rPr lang="en-US" smtClean="0"/>
-              <a:pPr/>
-              <a:t>5</a:t>
-            </a:fld>
-            <a:endParaRPr lang="en-US" dirty="0"/>
-          </a:p>
-        </p:txBody>
-      </p:sp>
-      <p:sp>
-        <p:nvSpPr>
-          <p:cNvPr id="4" name="Nexus:query=A|i_name|eq|anim">
-            <a:extLst>
-              <a:ext uri="{FF2B5EF4-FFF2-40B4-BE49-F238E27FC236}">
-                <a16:creationId xmlns:a16="http://schemas.microsoft.com/office/drawing/2014/main" id="{A511B573-6A09-4E66-7758-F7A5EA9A1EE2}"/>
-              </a:ext>
-            </a:extLst>
-          </p:cNvPr>
-          <p:cNvSpPr>
-            <a:spLocks noGrp="1"/>
-          </p:cNvSpPr>
-          <p:nvPr>
-            <p:ph type="media" sz="quarter" idx="11"/>
-          </p:nvPr>
-        </p:nvSpPr>
-        <p:spPr/>
-        <p:txBody>
-          <a:bodyPr/>
-          <a:lstStyle/>
-          <a:p>
-            <a:endParaRPr lang="en-US"/>
-          </a:p>
-        </p:txBody>
-      </p:sp>
-      <p:sp>
-        <p:nvSpPr>
-          <p:cNvPr id="5" name="Nexus:toc_link">
-            <a:extLst>
-              <a:ext uri="{FF2B5EF4-FFF2-40B4-BE49-F238E27FC236}">
-                <a16:creationId xmlns:a16="http://schemas.microsoft.com/office/drawing/2014/main" id="{BCF78C6D-CC4A-9FE0-06D5-AD1C8CFC6991}"/>
-              </a:ext>
-            </a:extLst>
-          </p:cNvPr>
-          <p:cNvSpPr>
-            <a:spLocks noGrp="1"/>
-          </p:cNvSpPr>
-          <p:nvPr>
-            <p:ph type="body" sz="quarter" idx="12"/>
-          </p:nvPr>
-        </p:nvSpPr>
-        <p:spPr/>
-        <p:txBody>
-          <a:bodyPr>
-            <a:normAutofit fontScale="55000" lnSpcReduction="20000"/>
-          </a:bodyPr>
-          <a:lstStyle/>
-          <a:p>
-            <a:endParaRPr lang="en-US"/>
-          </a:p>
-        </p:txBody>
-      </p:sp>
-      <p:sp>
-        <p:nvSpPr>
-          <p:cNvPr id="10" name="Nexus:query=A|i_name|eq|text;&amp;lines=3">
-            <a:extLst>
-              <a:ext uri="{FF2B5EF4-FFF2-40B4-BE49-F238E27FC236}">
-                <a16:creationId xmlns:a16="http://schemas.microsoft.com/office/drawing/2014/main" id="{B0B92442-BD21-2C91-7590-6CA7793BE5E1}"/>
-              </a:ext>
-            </a:extLst>
-          </p:cNvPr>
-          <p:cNvSpPr>
-            <a:spLocks noGrp="1"/>
-          </p:cNvSpPr>
-          <p:nvPr>
-            <p:ph type="body" sz="quarter" idx="13"/>
-          </p:nvPr>
-        </p:nvSpPr>
-        <p:spPr/>
-        <p:txBody>
-          <a:bodyPr/>
-          <a:lstStyle/>
-          <a:p>
-            <a:endParaRPr lang="en-US" dirty="0"/>
-          </a:p>
-        </p:txBody>
-      </p:sp>
-      <p:sp>
-        <p:nvSpPr>
-          <p:cNvPr id="11" name="Nexus:breadcrumbs">
-            <a:extLst>
-              <a:ext uri="{FF2B5EF4-FFF2-40B4-BE49-F238E27FC236}">
-                <a16:creationId xmlns:a16="http://schemas.microsoft.com/office/drawing/2014/main" id="{434AD1DF-A51E-5CC8-0CE1-49BB6C367303}"/>
-              </a:ext>
-            </a:extLst>
-          </p:cNvPr>
-          <p:cNvSpPr>
-            <a:spLocks noGrp="1"/>
-          </p:cNvSpPr>
-          <p:nvPr>
-            <p:ph type="body" sz="quarter" idx="14"/>
-          </p:nvPr>
-        </p:nvSpPr>
-        <p:spPr/>
-        <p:txBody>
-          <a:bodyPr>
-            <a:normAutofit fontScale="55000" lnSpcReduction="20000"/>
-          </a:bodyPr>
-          <a:lstStyle/>
-          <a:p>
-            <a:endParaRPr lang="en-US" dirty="0"/>
-          </a:p>
-        </p:txBody>
-      </p:sp>
-    </p:spTree>
-    <p:extLst>
-      <p:ext uri="{BB962C8B-B14F-4D97-AF65-F5344CB8AC3E}">
-        <p14:creationId xmlns:p14="http://schemas.microsoft.com/office/powerpoint/2010/main" val="401748813"/>
-      </p:ext>
-    </p:extLst>
-  </p:cSld>
-  <p:clrMapOvr>
-    <a:masterClrMapping/>
-  </p:clrMapOvr>
-  <mc:AlternateContent xmlns:mc="http://schemas.openxmlformats.org/markup-compatibility/2006" xmlns:p14="http://schemas.microsoft.com/office/powerpoint/2010/main">
-    <mc:Choice Requires="p14">
-      <p:transition p14:dur="250">
-        <p:fade/>
-      </p:transition>
-    </mc:Choice>
-    <mc:Fallback xmlns="">
-      <p:transition>
-        <p:fade/>
-      </p:transition>
-    </mc:Fallback>
-  </mc:AlternateContent>
-</p:sld>
-</file>
-
-<file path=ppt/slides/slide6.xml><?xml version="1.0" encoding="utf-8"?>
-<p:sld xmlns:a="http://schemas.openxmlformats.org/drawingml/2006/main" xmlns:r="http://schemas.openxmlformats.org/officeDocument/2006/relationships" xmlns:p="http://schemas.openxmlformats.org/presentationml/2006/main">
-  <p:cSld>
-    <p:spTree>
-      <p:nvGrpSpPr>
-        <p:cNvPr id="1" name=""/>
-        <p:cNvGrpSpPr/>
-        <p:nvPr/>
-      </p:nvGrpSpPr>
-      <p:grpSpPr>
-        <a:xfrm>
-          <a:off x="0" y="0"/>
-          <a:ext cx="0" cy="0"/>
-          <a:chOff x="0" y="0"/>
-          <a:chExt cx="0" cy="0"/>
-        </a:xfrm>
-      </p:grpSpPr>
-      <p:sp>
-        <p:nvSpPr>
-          <p:cNvPr id="4" name="Nexus:html_header">
-            <a:extLst>
-              <a:ext uri="{FF2B5EF4-FFF2-40B4-BE49-F238E27FC236}">
-                <a16:creationId xmlns:a16="http://schemas.microsoft.com/office/drawing/2014/main" id="{E65C334D-9DC6-B7BD-1F57-A029C42B1F40}"/>
-              </a:ext>
-            </a:extLst>
-          </p:cNvPr>
-          <p:cNvSpPr>
-            <a:spLocks noGrp="1"/>
-          </p:cNvSpPr>
-          <p:nvPr>
-            <p:ph type="title"/>
-          </p:nvPr>
-        </p:nvSpPr>
-        <p:spPr/>
-        <p:txBody>
-          <a:bodyPr/>
-          <a:lstStyle/>
-          <a:p>
-            <a:endParaRPr lang="en-US" dirty="0"/>
-          </a:p>
-        </p:txBody>
-      </p:sp>
-      <p:sp>
-        <p:nvSpPr>
-          <p:cNvPr id="3" name="Slide Number Placeholder 2">
-            <a:extLst>
-              <a:ext uri="{FF2B5EF4-FFF2-40B4-BE49-F238E27FC236}">
-                <a16:creationId xmlns:a16="http://schemas.microsoft.com/office/drawing/2014/main" id="{EFFF0229-4395-9783-6DD8-9EECD5483F3B}"/>
-              </a:ext>
-            </a:extLst>
-          </p:cNvPr>
-          <p:cNvSpPr>
-            <a:spLocks noGrp="1"/>
-          </p:cNvSpPr>
-          <p:nvPr>
-            <p:ph type="sldNum" sz="quarter" idx="10"/>
-          </p:nvPr>
-        </p:nvSpPr>
-        <p:spPr/>
-        <p:txBody>
-          <a:bodyPr/>
-          <a:lstStyle/>
-          <a:p>
-            <a:fld id="{F0D23093-2AB0-F74C-B865-1A12A15B650E}" type="slidenum">
-              <a:rPr lang="en-US" smtClean="0"/>
-              <a:pPr/>
-              <a:t>6</a:t>
-            </a:fld>
-            <a:endParaRPr lang="en-US" dirty="0"/>
-          </a:p>
-        </p:txBody>
-      </p:sp>
-      <p:sp>
-        <p:nvSpPr>
-          <p:cNvPr id="5" name="Nexus:toc_link">
-            <a:extLst>
-              <a:ext uri="{FF2B5EF4-FFF2-40B4-BE49-F238E27FC236}">
-                <a16:creationId xmlns:a16="http://schemas.microsoft.com/office/drawing/2014/main" id="{AB83DF5B-6DE0-401D-6A88-DC65CBD7E9F0}"/>
-              </a:ext>
-            </a:extLst>
-          </p:cNvPr>
-          <p:cNvSpPr>
-            <a:spLocks noGrp="1"/>
-          </p:cNvSpPr>
-          <p:nvPr>
-            <p:ph type="body" sz="quarter" idx="12"/>
-          </p:nvPr>
-        </p:nvSpPr>
-        <p:spPr/>
-        <p:txBody>
-          <a:bodyPr>
-            <a:normAutofit fontScale="55000" lnSpcReduction="20000"/>
-          </a:bodyPr>
-          <a:lstStyle/>
-          <a:p>
-            <a:r>
-              <a:rPr lang="en-US" dirty="0"/>
-              <a:t>toc</a:t>
-            </a:r>
-          </a:p>
-        </p:txBody>
-      </p:sp>
-      <p:sp>
-        <p:nvSpPr>
-          <p:cNvPr id="6" name="Nexus:breadcrumbs">
-            <a:extLst>
-              <a:ext uri="{FF2B5EF4-FFF2-40B4-BE49-F238E27FC236}">
-                <a16:creationId xmlns:a16="http://schemas.microsoft.com/office/drawing/2014/main" id="{71F20E89-61FC-6855-5093-2B107C38D246}"/>
-              </a:ext>
-            </a:extLst>
-          </p:cNvPr>
-          <p:cNvSpPr>
-            <a:spLocks noGrp="1"/>
-          </p:cNvSpPr>
-          <p:nvPr>
-            <p:ph type="body" sz="quarter" idx="13"/>
-          </p:nvPr>
-        </p:nvSpPr>
-        <p:spPr/>
-        <p:txBody>
-          <a:bodyPr>
-            <a:normAutofit fontScale="55000" lnSpcReduction="20000"/>
-          </a:bodyPr>
-          <a:lstStyle/>
-          <a:p>
-            <a:endParaRPr lang="en-US" dirty="0"/>
-          </a:p>
-        </p:txBody>
-      </p:sp>
-    </p:spTree>
-    <p:extLst>
-      <p:ext uri="{BB962C8B-B14F-4D97-AF65-F5344CB8AC3E}">
-        <p14:creationId xmlns:p14="http://schemas.microsoft.com/office/powerpoint/2010/main" val="2440210521"/>
-      </p:ext>
-    </p:extLst>
-  </p:cSld>
-  <p:clrMapOvr>
-    <a:masterClrMapping/>
-  </p:clrMapOvr>
-  <mc:AlternateContent xmlns:mc="http://schemas.openxmlformats.org/markup-compatibility/2006" xmlns:p14="http://schemas.microsoft.com/office/powerpoint/2010/main">
-    <mc:Choice Requires="p14">
-      <p:transition p14:dur="250">
-        <p:fade/>
-      </p:transition>
-    </mc:Choice>
-    <mc:Fallback xmlns="">
-      <p:transition>
-        <p:fade/>
-      </p:transition>
-    </mc:Fallback>
-  </mc:AlternateContent>
-</p:sld>
-</file>
-
-<file path=ppt/slides/slide7.xml><?xml version="1.0" encoding="utf-8"?>
-<p:sld xmlns:a="http://schemas.openxmlformats.org/drawingml/2006/main" xmlns:r="http://schemas.openxmlformats.org/officeDocument/2006/relationships" xmlns:p="http://schemas.openxmlformats.org/presentationml/2006/main">
-  <p:cSld>
-    <p:spTree>
-      <p:nvGrpSpPr>
-        <p:cNvPr id="1" name=""/>
-        <p:cNvGrpSpPr/>
-        <p:nvPr/>
-      </p:nvGrpSpPr>
-      <p:grpSpPr>
-        <a:xfrm>
-          <a:off x="0" y="0"/>
-          <a:ext cx="0" cy="0"/>
-          <a:chOff x="0" y="0"/>
-          <a:chExt cx="0" cy="0"/>
-        </a:xfrm>
-      </p:grpSpPr>
-      <p:sp>
-        <p:nvSpPr>
-          <p:cNvPr id="4" name="Nexus:html_header">
-            <a:extLst>
-              <a:ext uri="{FF2B5EF4-FFF2-40B4-BE49-F238E27FC236}">
-                <a16:creationId xmlns:a16="http://schemas.microsoft.com/office/drawing/2014/main" id="{E65C334D-9DC6-B7BD-1F57-A029C42B1F40}"/>
-              </a:ext>
-            </a:extLst>
-          </p:cNvPr>
-          <p:cNvSpPr>
-            <a:spLocks noGrp="1"/>
-          </p:cNvSpPr>
-          <p:nvPr>
-            <p:ph type="title"/>
-          </p:nvPr>
-        </p:nvSpPr>
-        <p:spPr/>
-        <p:txBody>
-          <a:bodyPr/>
-          <a:lstStyle/>
-          <a:p>
-            <a:endParaRPr lang="en-US" dirty="0"/>
-          </a:p>
-        </p:txBody>
-      </p:sp>
-      <p:sp>
-        <p:nvSpPr>
-          <p:cNvPr id="3" name="Slide Number Placeholder 2">
-            <a:extLst>
-              <a:ext uri="{FF2B5EF4-FFF2-40B4-BE49-F238E27FC236}">
-                <a16:creationId xmlns:a16="http://schemas.microsoft.com/office/drawing/2014/main" id="{EFFF0229-4395-9783-6DD8-9EECD5483F3B}"/>
-              </a:ext>
-            </a:extLst>
-          </p:cNvPr>
-          <p:cNvSpPr>
-            <a:spLocks noGrp="1"/>
-          </p:cNvSpPr>
-          <p:nvPr>
-            <p:ph type="sldNum" sz="quarter" idx="10"/>
-          </p:nvPr>
-        </p:nvSpPr>
-        <p:spPr/>
-        <p:txBody>
-          <a:bodyPr/>
-          <a:lstStyle/>
-          <a:p>
-            <a:fld id="{F0D23093-2AB0-F74C-B865-1A12A15B650E}" type="slidenum">
-              <a:rPr lang="en-US" smtClean="0"/>
-              <a:pPr/>
-              <a:t>7</a:t>
-            </a:fld>
-            <a:endParaRPr lang="en-US" dirty="0"/>
-          </a:p>
-        </p:txBody>
-      </p:sp>
-      <p:sp>
-        <p:nvSpPr>
-          <p:cNvPr id="5" name="Nexus:toc_link">
-            <a:extLst>
-              <a:ext uri="{FF2B5EF4-FFF2-40B4-BE49-F238E27FC236}">
-                <a16:creationId xmlns:a16="http://schemas.microsoft.com/office/drawing/2014/main" id="{AB83DF5B-6DE0-401D-6A88-DC65CBD7E9F0}"/>
-              </a:ext>
-            </a:extLst>
-          </p:cNvPr>
-          <p:cNvSpPr>
-            <a:spLocks noGrp="1"/>
-          </p:cNvSpPr>
-          <p:nvPr>
-            <p:ph type="body" sz="quarter" idx="12"/>
-          </p:nvPr>
-        </p:nvSpPr>
-        <p:spPr/>
-        <p:txBody>
-          <a:bodyPr>
-            <a:normAutofit fontScale="55000" lnSpcReduction="20000"/>
-          </a:bodyPr>
-          <a:lstStyle/>
-          <a:p>
-            <a:r>
-              <a:rPr lang="en-US" dirty="0"/>
-              <a:t>toc</a:t>
-            </a:r>
-          </a:p>
-        </p:txBody>
-      </p:sp>
-      <p:sp>
-        <p:nvSpPr>
-          <p:cNvPr id="6" name="Nexus:breadcrumbs">
-            <a:extLst>
-              <a:ext uri="{FF2B5EF4-FFF2-40B4-BE49-F238E27FC236}">
-                <a16:creationId xmlns:a16="http://schemas.microsoft.com/office/drawing/2014/main" id="{71F20E89-61FC-6855-5093-2B107C38D246}"/>
-              </a:ext>
-            </a:extLst>
-          </p:cNvPr>
-          <p:cNvSpPr>
-            <a:spLocks noGrp="1"/>
-          </p:cNvSpPr>
-          <p:nvPr>
-            <p:ph type="body" sz="quarter" idx="13"/>
-          </p:nvPr>
-        </p:nvSpPr>
-        <p:spPr/>
-        <p:txBody>
-          <a:bodyPr>
-            <a:normAutofit fontScale="55000" lnSpcReduction="20000"/>
-          </a:bodyPr>
-          <a:lstStyle/>
-          <a:p>
-            <a:endParaRPr lang="en-US" dirty="0"/>
-          </a:p>
-        </p:txBody>
-      </p:sp>
-    </p:spTree>
-    <p:extLst>
-      <p:ext uri="{BB962C8B-B14F-4D97-AF65-F5344CB8AC3E}">
-        <p14:creationId xmlns:p14="http://schemas.microsoft.com/office/powerpoint/2010/main" val="1548798711"/>
-      </p:ext>
-    </p:extLst>
-  </p:cSld>
-  <p:clrMapOvr>
-    <a:masterClrMapping/>
-  </p:clrMapOvr>
-  <mc:AlternateContent xmlns:mc="http://schemas.openxmlformats.org/markup-compatibility/2006" xmlns:p14="http://schemas.microsoft.com/office/powerpoint/2010/main">
-    <mc:Choice Requires="p14">
-      <p:transition p14:dur="250">
-        <p:fade/>
-      </p:transition>
-    </mc:Choice>
-    <mc:Fallback xmlns="">
-      <p:transition>
-        <p:fade/>
-      </p:transition>
-    </mc:Fallback>
-  </mc:AlternateContent>
-</p:sld>
-</file>
-
-<file path=ppt/slides/slide8.xml><?xml version="1.0" encoding="utf-8"?>
-<p:sld xmlns:a="http://schemas.openxmlformats.org/drawingml/2006/main" xmlns:r="http://schemas.openxmlformats.org/officeDocument/2006/relationships" xmlns:p="http://schemas.openxmlformats.org/presentationml/2006/main">
-  <p:cSld>
-    <p:spTree>
-      <p:nvGrpSpPr>
-        <p:cNvPr id="1" name=""/>
-        <p:cNvGrpSpPr/>
-        <p:nvPr/>
-      </p:nvGrpSpPr>
-      <p:grpSpPr>
-        <a:xfrm>
-          <a:off x="0" y="0"/>
-          <a:ext cx="0" cy="0"/>
-          <a:chOff x="0" y="0"/>
-          <a:chExt cx="0" cy="0"/>
-        </a:xfrm>
-      </p:grpSpPr>
-      <p:sp>
-        <p:nvSpPr>
-          <p:cNvPr id="9" name="Nexus:html_header">
-            <a:extLst>
-              <a:ext uri="{FF2B5EF4-FFF2-40B4-BE49-F238E27FC236}">
-                <a16:creationId xmlns:a16="http://schemas.microsoft.com/office/drawing/2014/main" id="{16CCA0BC-37AC-9B82-80E1-B4DD726934BB}"/>
-              </a:ext>
-            </a:extLst>
-          </p:cNvPr>
-          <p:cNvSpPr>
-            <a:spLocks noGrp="1"/>
-          </p:cNvSpPr>
-          <p:nvPr>
-            <p:ph type="title"/>
-          </p:nvPr>
-        </p:nvSpPr>
-        <p:spPr/>
-        <p:txBody>
-          <a:bodyPr/>
-          <a:lstStyle/>
-          <a:p>
-            <a:endParaRPr lang="en-US"/>
-          </a:p>
-        </p:txBody>
-      </p:sp>
-      <p:sp>
-        <p:nvSpPr>
-          <p:cNvPr id="3" name="Slide Number Placeholder 2">
-            <a:extLst>
-              <a:ext uri="{FF2B5EF4-FFF2-40B4-BE49-F238E27FC236}">
-                <a16:creationId xmlns:a16="http://schemas.microsoft.com/office/drawing/2014/main" id="{4E31EF83-8190-2382-481F-E16B32C1159B}"/>
-              </a:ext>
-            </a:extLst>
-          </p:cNvPr>
-          <p:cNvSpPr>
-            <a:spLocks noGrp="1"/>
-          </p:cNvSpPr>
-          <p:nvPr>
-            <p:ph type="sldNum" sz="quarter" idx="10"/>
-          </p:nvPr>
-        </p:nvSpPr>
-        <p:spPr/>
-        <p:txBody>
-          <a:bodyPr/>
-          <a:lstStyle/>
-          <a:p>
-            <a:fld id="{F0D23093-2AB0-F74C-B865-1A12A15B650E}" type="slidenum">
-              <a:rPr lang="en-US" smtClean="0"/>
-              <a:pPr/>
-              <a:t>8</a:t>
-            </a:fld>
-            <a:endParaRPr lang="en-US" dirty="0"/>
-          </a:p>
-        </p:txBody>
-      </p:sp>
-      <p:sp>
-        <p:nvSpPr>
-          <p:cNvPr id="10" name="Nexus:query=A|i_name|eq|table&amp;rows=6&amp;cols=5">
-            <a:extLst>
-              <a:ext uri="{FF2B5EF4-FFF2-40B4-BE49-F238E27FC236}">
-                <a16:creationId xmlns:a16="http://schemas.microsoft.com/office/drawing/2014/main" id="{64666E78-EA83-3B01-37B8-CFB2AA38A1A5}"/>
-              </a:ext>
-            </a:extLst>
-          </p:cNvPr>
-          <p:cNvSpPr>
-            <a:spLocks noGrp="1"/>
-          </p:cNvSpPr>
-          <p:nvPr>
-            <p:ph type="tbl" sz="quarter" idx="11"/>
-          </p:nvPr>
-        </p:nvSpPr>
-        <p:spPr/>
-        <p:txBody>
-          <a:bodyPr/>
-          <a:lstStyle/>
-          <a:p>
-            <a:endParaRPr lang="en-US"/>
-          </a:p>
-        </p:txBody>
-      </p:sp>
-      <p:sp>
-        <p:nvSpPr>
-          <p:cNvPr id="5" name="Nexus:toc_link">
-            <a:extLst>
-              <a:ext uri="{FF2B5EF4-FFF2-40B4-BE49-F238E27FC236}">
-                <a16:creationId xmlns:a16="http://schemas.microsoft.com/office/drawing/2014/main" id="{0E90428C-6670-BD74-1BB8-BFAE8E455207}"/>
-              </a:ext>
-            </a:extLst>
-          </p:cNvPr>
-          <p:cNvSpPr>
-            <a:spLocks noGrp="1"/>
-          </p:cNvSpPr>
-          <p:nvPr>
-            <p:ph type="body" sz="quarter" idx="12"/>
-          </p:nvPr>
-        </p:nvSpPr>
-        <p:spPr/>
-        <p:txBody>
-          <a:bodyPr>
-            <a:normAutofit fontScale="55000" lnSpcReduction="20000"/>
-          </a:bodyPr>
-          <a:lstStyle/>
-          <a:p>
-            <a:r>
-              <a:rPr lang="en-US" dirty="0"/>
-              <a:t>TOC</a:t>
-            </a:r>
-          </a:p>
-        </p:txBody>
-      </p:sp>
-      <p:sp>
-        <p:nvSpPr>
-          <p:cNvPr id="11" name="Nexus:breadcrumbs">
-            <a:extLst>
-              <a:ext uri="{FF2B5EF4-FFF2-40B4-BE49-F238E27FC236}">
-                <a16:creationId xmlns:a16="http://schemas.microsoft.com/office/drawing/2014/main" id="{3578F5D2-E067-0B5A-5A18-09CC8F2A90A6}"/>
-              </a:ext>
-            </a:extLst>
-          </p:cNvPr>
-          <p:cNvSpPr>
-            <a:spLocks noGrp="1"/>
-          </p:cNvSpPr>
-          <p:nvPr>
-            <p:ph type="body" sz="quarter" idx="13"/>
-          </p:nvPr>
-        </p:nvSpPr>
-        <p:spPr/>
-        <p:txBody>
-          <a:bodyPr>
-            <a:normAutofit fontScale="55000" lnSpcReduction="20000"/>
-          </a:bodyPr>
-          <a:lstStyle/>
-          <a:p>
-            <a:endParaRPr lang="en-US"/>
-          </a:p>
-        </p:txBody>
-      </p:sp>
-    </p:spTree>
-    <p:extLst>
-      <p:ext uri="{BB962C8B-B14F-4D97-AF65-F5344CB8AC3E}">
-        <p14:creationId xmlns:p14="http://schemas.microsoft.com/office/powerpoint/2010/main" val="2950471175"/>
-      </p:ext>
-    </p:extLst>
-  </p:cSld>
-  <p:clrMapOvr>
-    <a:masterClrMapping/>
-  </p:clrMapOvr>
-  <mc:AlternateContent xmlns:mc="http://schemas.openxmlformats.org/markup-compatibility/2006" xmlns:p14="http://schemas.microsoft.com/office/powerpoint/2010/main">
-    <mc:Choice Requires="p14">
-      <p:transition p14:dur="250">
-        <p:fade/>
-      </p:transition>
-    </mc:Choice>
-    <mc:Fallback xmlns="">
-      <p:transition>
-        <p:fade/>
-      </p:transition>
-    </mc:Fallback>
-  </mc:AlternateContent>
-</p:sld>
-</file>
-
-<file path=ppt/slides/slide9.xml><?xml version="1.0" encoding="utf-8"?>
-<p:sld xmlns:a="http://schemas.openxmlformats.org/drawingml/2006/main" xmlns:r="http://schemas.openxmlformats.org/officeDocument/2006/relationships" xmlns:p="http://schemas.openxmlformats.org/presentationml/2006/main">
-  <p:cSld>
-    <p:spTree>
-      <p:nvGrpSpPr>
-        <p:cNvPr id="1" name=""/>
-        <p:cNvGrpSpPr/>
-        <p:nvPr/>
-      </p:nvGrpSpPr>
-      <p:grpSpPr>
-        <a:xfrm>
-          <a:off x="0" y="0"/>
-          <a:ext cx="0" cy="0"/>
-          <a:chOff x="0" y="0"/>
-          <a:chExt cx="0" cy="0"/>
-        </a:xfrm>
-      </p:grpSpPr>
-      <p:sp>
-        <p:nvSpPr>
-          <p:cNvPr id="5" name="Nexus:query=A|i_name|eq|tree_title">
-            <a:extLst>
-              <a:ext uri="{FF2B5EF4-FFF2-40B4-BE49-F238E27FC236}">
-                <a16:creationId xmlns:a16="http://schemas.microsoft.com/office/drawing/2014/main" id="{1269C953-8836-49F2-8EC7-4047D1C73857}"/>
-              </a:ext>
-            </a:extLst>
-          </p:cNvPr>
-          <p:cNvSpPr>
-            <a:spLocks noGrp="1"/>
-          </p:cNvSpPr>
-          <p:nvPr>
-            <p:ph type="title"/>
-          </p:nvPr>
-        </p:nvSpPr>
-        <p:spPr/>
-        <p:txBody>
-          <a:bodyPr/>
-          <a:lstStyle/>
-          <a:p>
-            <a:endParaRPr lang="en-US" dirty="0"/>
-          </a:p>
-        </p:txBody>
-      </p:sp>
-      <p:sp>
-        <p:nvSpPr>
-          <p:cNvPr id="3" name="Slide Number Placeholder 2">
-            <a:extLst>
-              <a:ext uri="{FF2B5EF4-FFF2-40B4-BE49-F238E27FC236}">
-                <a16:creationId xmlns:a16="http://schemas.microsoft.com/office/drawing/2014/main" id="{73CF9F6C-0422-4E16-99CF-0A2C6203AF55}"/>
-              </a:ext>
-            </a:extLst>
-          </p:cNvPr>
-          <p:cNvSpPr>
-            <a:spLocks noGrp="1"/>
-          </p:cNvSpPr>
-          <p:nvPr>
-            <p:ph type="sldNum" sz="quarter" idx="10"/>
-          </p:nvPr>
-        </p:nvSpPr>
-        <p:spPr/>
-        <p:txBody>
-          <a:bodyPr/>
-          <a:lstStyle/>
-          <a:p>
-            <a:fld id="{F0D23093-2AB0-F74C-B865-1A12A15B650E}" type="slidenum">
-              <a:rPr lang="en-US" smtClean="0"/>
-              <a:pPr/>
-              <a:t>9</a:t>
             </a:fld>
             <a:endParaRPr lang="en-US" dirty="0"/>
           </a:p>
@@ -7333,6 +5090,257 @@
     <p:extLst>
       <p:ext uri="{BB962C8B-B14F-4D97-AF65-F5344CB8AC3E}">
         <p14:creationId xmlns:p14="http://schemas.microsoft.com/office/powerpoint/2010/main" val="3078332982"/>
+      </p:ext>
+    </p:extLst>
+  </p:cSld>
+  <p:clrMapOvr>
+    <a:masterClrMapping/>
+  </p:clrMapOvr>
+  <mc:AlternateContent xmlns:mc="http://schemas.openxmlformats.org/markup-compatibility/2006" xmlns:p14="http://schemas.microsoft.com/office/powerpoint/2010/main">
+    <mc:Choice Requires="p14">
+      <p:transition p14:dur="250">
+        <p:fade/>
+      </p:transition>
+    </mc:Choice>
+    <mc:Fallback xmlns="">
+      <p:transition>
+        <p:fade/>
+      </p:transition>
+    </mc:Fallback>
+  </mc:AlternateContent>
+</p:sld>
+</file>
+
+<file path=ppt/slides/slide5.xml><?xml version="1.0" encoding="utf-8"?>
+<p:sld xmlns:a="http://schemas.openxmlformats.org/drawingml/2006/main" xmlns:r="http://schemas.openxmlformats.org/officeDocument/2006/relationships" xmlns:p="http://schemas.openxmlformats.org/presentationml/2006/main">
+  <p:cSld>
+    <p:spTree>
+      <p:nvGrpSpPr>
+        <p:cNvPr id="1" name=""/>
+        <p:cNvGrpSpPr/>
+        <p:nvPr/>
+      </p:nvGrpSpPr>
+      <p:grpSpPr>
+        <a:xfrm>
+          <a:off x="0" y="0"/>
+          <a:ext cx="0" cy="0"/>
+          <a:chOff x="0" y="0"/>
+          <a:chExt cx="0" cy="0"/>
+        </a:xfrm>
+      </p:grpSpPr>
+      <p:sp>
+        <p:nvSpPr>
+          <p:cNvPr id="9" name="Nexus:query=A|i_name|eq|line_plot_title">
+            <a:extLst>
+              <a:ext uri="{FF2B5EF4-FFF2-40B4-BE49-F238E27FC236}">
+                <a16:creationId xmlns:a16="http://schemas.microsoft.com/office/drawing/2014/main" id="{4402613D-5DED-4F17-A5D9-DC4D35D4C72F}"/>
+              </a:ext>
+            </a:extLst>
+          </p:cNvPr>
+          <p:cNvSpPr>
+            <a:spLocks noGrp="1"/>
+          </p:cNvSpPr>
+          <p:nvPr>
+            <p:ph type="title"/>
+          </p:nvPr>
+        </p:nvSpPr>
+        <p:spPr/>
+        <p:txBody>
+          <a:bodyPr/>
+          <a:lstStyle/>
+          <a:p>
+            <a:endParaRPr lang="en-US" dirty="0"/>
+          </a:p>
+        </p:txBody>
+      </p:sp>
+      <p:sp>
+        <p:nvSpPr>
+          <p:cNvPr id="3" name="Slide Number Placeholder 2">
+            <a:extLst>
+              <a:ext uri="{FF2B5EF4-FFF2-40B4-BE49-F238E27FC236}">
+                <a16:creationId xmlns:a16="http://schemas.microsoft.com/office/drawing/2014/main" id="{F0C38A62-2AFB-4657-B26E-B3EFD332E461}"/>
+              </a:ext>
+            </a:extLst>
+          </p:cNvPr>
+          <p:cNvSpPr>
+            <a:spLocks noGrp="1"/>
+          </p:cNvSpPr>
+          <p:nvPr>
+            <p:ph type="sldNum" sz="quarter" idx="10"/>
+          </p:nvPr>
+        </p:nvSpPr>
+        <p:spPr/>
+        <p:txBody>
+          <a:bodyPr/>
+          <a:lstStyle/>
+          <a:p>
+            <a:fld id="{F0D23093-2AB0-F74C-B865-1A12A15B650E}" type="slidenum">
+              <a:rPr lang="en-US" smtClean="0"/>
+              <a:pPr/>
+              <a:t>5</a:t>
+            </a:fld>
+            <a:endParaRPr lang="en-US" dirty="0"/>
+          </a:p>
+        </p:txBody>
+      </p:sp>
+      <p:sp>
+        <p:nvSpPr>
+          <p:cNvPr id="10" name="Nexus:query=A|i_name|eq|line_plot">
+            <a:extLst>
+              <a:ext uri="{FF2B5EF4-FFF2-40B4-BE49-F238E27FC236}">
+                <a16:creationId xmlns:a16="http://schemas.microsoft.com/office/drawing/2014/main" id="{105E7E1A-7A23-4FA2-91AA-43A098EC7F80}"/>
+              </a:ext>
+            </a:extLst>
+          </p:cNvPr>
+          <p:cNvSpPr>
+            <a:spLocks noGrp="1"/>
+          </p:cNvSpPr>
+          <p:nvPr>
+            <p:ph type="chart" sz="quarter" idx="11"/>
+          </p:nvPr>
+        </p:nvSpPr>
+        <p:spPr>
+          <a:xfrm>
+            <a:off x="457201" y="1313773"/>
+            <a:ext cx="8229600" cy="3492885"/>
+          </a:xfrm>
+        </p:spPr>
+        <p:txBody>
+          <a:bodyPr/>
+          <a:lstStyle/>
+          <a:p>
+            <a:endParaRPr lang="en-US"/>
+          </a:p>
+        </p:txBody>
+      </p:sp>
+    </p:spTree>
+    <p:extLst>
+      <p:ext uri="{BB962C8B-B14F-4D97-AF65-F5344CB8AC3E}">
+        <p14:creationId xmlns:p14="http://schemas.microsoft.com/office/powerpoint/2010/main" val="2694634188"/>
+      </p:ext>
+    </p:extLst>
+  </p:cSld>
+  <p:clrMapOvr>
+    <a:masterClrMapping/>
+  </p:clrMapOvr>
+  <mc:AlternateContent xmlns:mc="http://schemas.openxmlformats.org/markup-compatibility/2006" xmlns:p14="http://schemas.microsoft.com/office/powerpoint/2010/main">
+    <mc:Choice Requires="p14">
+      <p:transition p14:dur="250">
+        <p:fade/>
+      </p:transition>
+    </mc:Choice>
+    <mc:Fallback xmlns="">
+      <p:transition>
+        <p:fade/>
+      </p:transition>
+    </mc:Fallback>
+  </mc:AlternateContent>
+</p:sld>
+</file>
+
+<file path=ppt/slides/slide6.xml><?xml version="1.0" encoding="utf-8"?>
+<p:sld xmlns:a="http://schemas.openxmlformats.org/drawingml/2006/main" xmlns:r="http://schemas.openxmlformats.org/officeDocument/2006/relationships" xmlns:p="http://schemas.openxmlformats.org/presentationml/2006/main">
+  <p:cSld>
+    <p:spTree>
+      <p:nvGrpSpPr>
+        <p:cNvPr id="1" name=""/>
+        <p:cNvGrpSpPr/>
+        <p:nvPr/>
+      </p:nvGrpSpPr>
+      <p:grpSpPr>
+        <a:xfrm>
+          <a:off x="0" y="0"/>
+          <a:ext cx="0" cy="0"/>
+          <a:chOff x="0" y="0"/>
+          <a:chExt cx="0" cy="0"/>
+        </a:xfrm>
+      </p:grpSpPr>
+      <p:sp>
+        <p:nvSpPr>
+          <p:cNvPr id="3" name="Slide Number Placeholder 2">
+            <a:extLst>
+              <a:ext uri="{FF2B5EF4-FFF2-40B4-BE49-F238E27FC236}">
+                <a16:creationId xmlns:a16="http://schemas.microsoft.com/office/drawing/2014/main" id="{0FB483A2-76AF-4DBF-9017-06B493C33173}"/>
+              </a:ext>
+            </a:extLst>
+          </p:cNvPr>
+          <p:cNvSpPr>
+            <a:spLocks noGrp="1"/>
+          </p:cNvSpPr>
+          <p:nvPr>
+            <p:ph type="sldNum" sz="quarter" idx="10"/>
+          </p:nvPr>
+        </p:nvSpPr>
+        <p:spPr/>
+        <p:txBody>
+          <a:bodyPr/>
+          <a:lstStyle/>
+          <a:p>
+            <a:fld id="{F0D23093-2AB0-F74C-B865-1A12A15B650E}" type="slidenum">
+              <a:rPr lang="en-US" smtClean="0"/>
+              <a:pPr/>
+              <a:t>6</a:t>
+            </a:fld>
+            <a:endParaRPr lang="en-US" dirty="0"/>
+          </a:p>
+        </p:txBody>
+      </p:sp>
+      <p:sp>
+        <p:nvSpPr>
+          <p:cNvPr id="2" name="Nexus:query=A|i_type|cont|file;A|i_name|cont|session">
+            <a:extLst>
+              <a:ext uri="{FF2B5EF4-FFF2-40B4-BE49-F238E27FC236}">
+                <a16:creationId xmlns:a16="http://schemas.microsoft.com/office/drawing/2014/main" id="{6354F7CA-CFB0-10BE-39D1-A4406787371F}"/>
+              </a:ext>
+            </a:extLst>
+          </p:cNvPr>
+          <p:cNvSpPr>
+            <a:spLocks noGrp="1"/>
+          </p:cNvSpPr>
+          <p:nvPr>
+            <p:ph type="pic" sz="quarter" idx="11"/>
+          </p:nvPr>
+        </p:nvSpPr>
+        <p:spPr/>
+        <p:txBody>
+          <a:bodyPr/>
+          <a:lstStyle/>
+          <a:p>
+            <a:endParaRPr lang="en-US"/>
+          </a:p>
+        </p:txBody>
+      </p:sp>
+      <p:sp>
+        <p:nvSpPr>
+          <p:cNvPr id="4" name="Nexus:query=A|i_type|cont|image;A|i_name|cont|logo;">
+            <a:extLst>
+              <a:ext uri="{FF2B5EF4-FFF2-40B4-BE49-F238E27FC236}">
+                <a16:creationId xmlns:a16="http://schemas.microsoft.com/office/drawing/2014/main" id="{A6F80112-291C-8E81-377F-3579177E40F5}"/>
+              </a:ext>
+            </a:extLst>
+          </p:cNvPr>
+          <p:cNvSpPr>
+            <a:spLocks noGrp="1"/>
+          </p:cNvSpPr>
+          <p:nvPr>
+            <p:ph type="pic" sz="quarter" idx="12"/>
+          </p:nvPr>
+        </p:nvSpPr>
+        <p:spPr/>
+        <p:txBody>
+          <a:bodyPr>
+            <a:normAutofit fontScale="55000" lnSpcReduction="20000"/>
+          </a:bodyPr>
+          <a:lstStyle/>
+          <a:p>
+            <a:endParaRPr lang="en-US"/>
+          </a:p>
+        </p:txBody>
+      </p:sp>
+    </p:spTree>
+    <p:extLst>
+      <p:ext uri="{BB962C8B-B14F-4D97-AF65-F5344CB8AC3E}">
+        <p14:creationId xmlns:p14="http://schemas.microsoft.com/office/powerpoint/2010/main" val="416096387"/>
       </p:ext>
     </p:extLst>
   </p:cSld>

</xml_diff>